<commit_message>
day and night cycle prototype
</commit_message>
<xml_diff>
--- a/Documents/Pitch.pptx
+++ b/Documents/Pitch.pptx
@@ -6,12 +6,14 @@
   </p:sldMasterIdLst>
   <p:sldIdLst>
     <p:sldId id="256" r:id="rId2"/>
-    <p:sldId id="257" r:id="rId3"/>
-    <p:sldId id="258" r:id="rId4"/>
-    <p:sldId id="259" r:id="rId5"/>
-    <p:sldId id="260" r:id="rId6"/>
-    <p:sldId id="261" r:id="rId7"/>
-    <p:sldId id="262" r:id="rId8"/>
+    <p:sldId id="263" r:id="rId3"/>
+    <p:sldId id="257" r:id="rId4"/>
+    <p:sldId id="258" r:id="rId5"/>
+    <p:sldId id="264" r:id="rId6"/>
+    <p:sldId id="259" r:id="rId7"/>
+    <p:sldId id="260" r:id="rId8"/>
+    <p:sldId id="261" r:id="rId9"/>
+    <p:sldId id="262" r:id="rId10"/>
   </p:sldIdLst>
   <p:sldSz cx="12192000" cy="6858000"/>
   <p:notesSz cx="6858000" cy="9144000"/>
@@ -110,6 +112,11 @@
       </a:defRPr>
     </a:lvl9pPr>
   </p:defaultTextStyle>
+  <p:extLst>
+    <p:ext uri="{EFAFB233-063F-42B5-8137-9DF3F51BA10A}">
+      <p15:sldGuideLst xmlns:p15="http://schemas.microsoft.com/office/powerpoint/2012/main"/>
+    </p:ext>
+  </p:extLst>
 </p:presentation>
 </file>
 
@@ -264,7 +271,7 @@
           <a:p>
             <a:fld id="{9D0D92BC-42A9-434B-8530-ADBF4485E407}" type="datetimeFigureOut">
               <a:rPr lang="en-US" smtClean="0"/>
-              <a:t>3/7/2023</a:t>
+              <a:t>3/8/2023</a:t>
             </a:fld>
             <a:endParaRPr lang="en-US"/>
           </a:p>
@@ -515,7 +522,7 @@
           <a:p>
             <a:fld id="{9D0D92BC-42A9-434B-8530-ADBF4485E407}" type="datetimeFigureOut">
               <a:rPr lang="en-US" smtClean="0"/>
-              <a:t>3/7/2023</a:t>
+              <a:t>3/8/2023</a:t>
             </a:fld>
             <a:endParaRPr lang="en-US"/>
           </a:p>
@@ -723,7 +730,7 @@
           <a:p>
             <a:fld id="{9D0D92BC-42A9-434B-8530-ADBF4485E407}" type="datetimeFigureOut">
               <a:rPr lang="en-US" smtClean="0"/>
-              <a:t>3/7/2023</a:t>
+              <a:t>3/8/2023</a:t>
             </a:fld>
             <a:endParaRPr lang="en-US"/>
           </a:p>
@@ -921,7 +928,7 @@
           <a:p>
             <a:fld id="{9D0D92BC-42A9-434B-8530-ADBF4485E407}" type="datetimeFigureOut">
               <a:rPr lang="en-US" smtClean="0"/>
-              <a:t>3/7/2023</a:t>
+              <a:t>3/8/2023</a:t>
             </a:fld>
             <a:endParaRPr lang="en-US"/>
           </a:p>
@@ -1201,7 +1208,7 @@
           <a:p>
             <a:fld id="{9D0D92BC-42A9-434B-8530-ADBF4485E407}" type="datetimeFigureOut">
               <a:rPr lang="en-US" smtClean="0"/>
-              <a:t>3/7/2023</a:t>
+              <a:t>3/8/2023</a:t>
             </a:fld>
             <a:endParaRPr lang="en-US"/>
           </a:p>
@@ -1509,7 +1516,7 @@
           <a:p>
             <a:fld id="{9D0D92BC-42A9-434B-8530-ADBF4485E407}" type="datetimeFigureOut">
               <a:rPr lang="en-US" smtClean="0"/>
-              <a:t>3/7/2023</a:t>
+              <a:t>3/8/2023</a:t>
             </a:fld>
             <a:endParaRPr lang="en-US"/>
           </a:p>
@@ -1929,7 +1936,7 @@
           <a:p>
             <a:fld id="{9D0D92BC-42A9-434B-8530-ADBF4485E407}" type="datetimeFigureOut">
               <a:rPr lang="en-US" smtClean="0"/>
-              <a:t>3/7/2023</a:t>
+              <a:t>3/8/2023</a:t>
             </a:fld>
             <a:endParaRPr lang="en-US"/>
           </a:p>
@@ -2161,7 +2168,7 @@
           <a:p>
             <a:fld id="{9D0D92BC-42A9-434B-8530-ADBF4485E407}" type="datetimeFigureOut">
               <a:rPr lang="en-US" smtClean="0"/>
-              <a:t>3/7/2023</a:t>
+              <a:t>3/8/2023</a:t>
             </a:fld>
             <a:endParaRPr lang="en-US"/>
           </a:p>
@@ -2274,7 +2281,7 @@
           <a:p>
             <a:fld id="{9D0D92BC-42A9-434B-8530-ADBF4485E407}" type="datetimeFigureOut">
               <a:rPr lang="en-US" smtClean="0"/>
-              <a:t>3/7/2023</a:t>
+              <a:t>3/8/2023</a:t>
             </a:fld>
             <a:endParaRPr lang="en-US"/>
           </a:p>
@@ -2591,7 +2598,7 @@
           <a:p>
             <a:fld id="{9D0D92BC-42A9-434B-8530-ADBF4485E407}" type="datetimeFigureOut">
               <a:rPr lang="en-US" smtClean="0"/>
-              <a:t>3/7/2023</a:t>
+              <a:t>3/8/2023</a:t>
             </a:fld>
             <a:endParaRPr lang="en-US"/>
           </a:p>
@@ -2883,7 +2890,7 @@
           <a:p>
             <a:fld id="{9D0D92BC-42A9-434B-8530-ADBF4485E407}" type="datetimeFigureOut">
               <a:rPr lang="en-US" smtClean="0"/>
-              <a:t>3/7/2023</a:t>
+              <a:t>3/8/2023</a:t>
             </a:fld>
             <a:endParaRPr lang="en-US"/>
           </a:p>
@@ -3190,7 +3197,7 @@
             <a:fld id="{9D0D92BC-42A9-434B-8530-ADBF4485E407}" type="datetimeFigureOut">
               <a:rPr lang="en-US" smtClean="0"/>
               <a:pPr/>
-              <a:t>3/7/2023</a:t>
+              <a:t>3/8/2023</a:t>
             </a:fld>
             <a:endParaRPr lang="en-US" dirty="0"/>
           </a:p>
@@ -3968,10 +3975,10 @@
       </p:grpSpPr>
       <p:sp useBgFill="1">
         <p:nvSpPr>
-          <p:cNvPr id="10" name="Rectangle 9">
-            <a:extLst>
-              <a:ext uri="{FF2B5EF4-FFF2-40B4-BE49-F238E27FC236}">
-                <a16:creationId xmlns:a16="http://schemas.microsoft.com/office/drawing/2014/main" id="{D70BC64E-B094-49DE-BD9C-DB662FCF598F}"/>
+          <p:cNvPr id="2059" name="Rectangle 2058">
+            <a:extLst>
+              <a:ext uri="{FF2B5EF4-FFF2-40B4-BE49-F238E27FC236}">
+                <a16:creationId xmlns:a16="http://schemas.microsoft.com/office/drawing/2014/main" id="{9184DF83-39E6-4BDC-9E23-17F25AB44C55}"/>
               </a:ext>
               <a:ext uri="{C183D7F6-B498-43B3-948B-1728B52AA6E4}">
                 <adec:decorative xmlns:adec="http://schemas.microsoft.com/office/drawing/2017/decorative" val="1"/>
@@ -4047,7 +4054,7 @@
           <p:cNvPr id="2" name="Title 1">
             <a:extLst>
               <a:ext uri="{FF2B5EF4-FFF2-40B4-BE49-F238E27FC236}">
-                <a16:creationId xmlns:a16="http://schemas.microsoft.com/office/drawing/2014/main" id="{3D1A1391-78CF-F967-6838-FDEBD8EDAC5A}"/>
+                <a16:creationId xmlns:a16="http://schemas.microsoft.com/office/drawing/2014/main" id="{4AC3380B-13F1-ADE2-C632-5BC27CDDA9FC}"/>
               </a:ext>
             </a:extLst>
           </p:cNvPr>
@@ -4060,8 +4067,8 @@
         </p:nvSpPr>
         <p:spPr>
           <a:xfrm>
-            <a:off x="952500" y="723900"/>
-            <a:ext cx="4417522" cy="1181100"/>
+            <a:off x="7001617" y="762000"/>
+            <a:ext cx="4242400" cy="1141004"/>
           </a:xfrm>
         </p:spPr>
         <p:txBody>
@@ -4072,17 +4079,107 @@
           <a:p>
             <a:r>
               <a:rPr lang="en-US" dirty="0"/>
-              <a:t>Project plan</a:t>
-            </a:r>
-          </a:p>
-        </p:txBody>
-      </p:sp>
-      <p:sp>
-        <p:nvSpPr>
-          <p:cNvPr id="12" name="Rectangle 11">
-            <a:extLst>
-              <a:ext uri="{FF2B5EF4-FFF2-40B4-BE49-F238E27FC236}">
-                <a16:creationId xmlns:a16="http://schemas.microsoft.com/office/drawing/2014/main" id="{A718E0F5-1EF3-64D6-0802-B7983AC63269}"/>
+              <a:t>Project Pitch</a:t>
+            </a:r>
+          </a:p>
+        </p:txBody>
+      </p:sp>
+      <p:pic>
+        <p:nvPicPr>
+          <p:cNvPr id="2054" name="Picture 6" descr="Tips for Playing Rimworld - Royalty – GameSpew">
+            <a:extLst>
+              <a:ext uri="{FF2B5EF4-FFF2-40B4-BE49-F238E27FC236}">
+                <a16:creationId xmlns:a16="http://schemas.microsoft.com/office/drawing/2014/main" id="{28679B34-FF47-9F88-1C3B-C7BE45424C1D}"/>
+              </a:ext>
+            </a:extLst>
+          </p:cNvPr>
+          <p:cNvPicPr>
+            <a:picLocks noChangeAspect="1" noChangeArrowheads="1"/>
+          </p:cNvPicPr>
+          <p:nvPr/>
+        </p:nvPicPr>
+        <p:blipFill rotWithShape="1">
+          <a:blip r:embed="rId2">
+            <a:extLst>
+              <a:ext uri="{28A0092B-C50C-407E-A947-70E740481C1C}">
+                <a14:useLocalDpi xmlns:a14="http://schemas.microsoft.com/office/drawing/2010/main" val="0"/>
+              </a:ext>
+            </a:extLst>
+          </a:blip>
+          <a:srcRect r="334" b="-1"/>
+          <a:stretch/>
+        </p:blipFill>
+        <p:spPr bwMode="auto">
+          <a:xfrm>
+            <a:off x="20" y="10"/>
+            <a:ext cx="6095980" cy="3440526"/>
+          </a:xfrm>
+          <a:prstGeom prst="rect">
+            <a:avLst/>
+          </a:prstGeom>
+          <a:noFill/>
+          <a:extLst>
+            <a:ext uri="{909E8E84-426E-40DD-AFC4-6F175D3DCCD1}">
+              <a14:hiddenFill xmlns:a14="http://schemas.microsoft.com/office/drawing/2010/main">
+                <a:solidFill>
+                  <a:srgbClr val="FFFFFF"/>
+                </a:solidFill>
+              </a14:hiddenFill>
+            </a:ext>
+          </a:extLst>
+        </p:spPr>
+      </p:pic>
+      <p:pic>
+        <p:nvPicPr>
+          <p:cNvPr id="2052" name="Picture 4" descr="Importance of Elderly Caretakers – Dry Harbor Rehab">
+            <a:extLst>
+              <a:ext uri="{FF2B5EF4-FFF2-40B4-BE49-F238E27FC236}">
+                <a16:creationId xmlns:a16="http://schemas.microsoft.com/office/drawing/2014/main" id="{2CD9B372-7E45-5F33-22E1-1D41F3FE0B2C}"/>
+              </a:ext>
+            </a:extLst>
+          </p:cNvPr>
+          <p:cNvPicPr>
+            <a:picLocks noChangeAspect="1" noChangeArrowheads="1"/>
+          </p:cNvPicPr>
+          <p:nvPr/>
+        </p:nvPicPr>
+        <p:blipFill rotWithShape="1">
+          <a:blip r:embed="rId3">
+            <a:extLst>
+              <a:ext uri="{28A0092B-C50C-407E-A947-70E740481C1C}">
+                <a14:useLocalDpi xmlns:a14="http://schemas.microsoft.com/office/drawing/2010/main" val="0"/>
+              </a:ext>
+            </a:extLst>
+          </a:blip>
+          <a:srcRect b="26464"/>
+          <a:stretch/>
+        </p:blipFill>
+        <p:spPr bwMode="auto">
+          <a:xfrm>
+            <a:off x="20" y="3429000"/>
+            <a:ext cx="6095980" cy="3440536"/>
+          </a:xfrm>
+          <a:prstGeom prst="rect">
+            <a:avLst/>
+          </a:prstGeom>
+          <a:noFill/>
+          <a:extLst>
+            <a:ext uri="{909E8E84-426E-40DD-AFC4-6F175D3DCCD1}">
+              <a14:hiddenFill xmlns:a14="http://schemas.microsoft.com/office/drawing/2010/main">
+                <a:solidFill>
+                  <a:srgbClr val="FFFFFF"/>
+                </a:solidFill>
+              </a14:hiddenFill>
+            </a:ext>
+          </a:extLst>
+        </p:spPr>
+      </p:pic>
+      <p:sp>
+        <p:nvSpPr>
+          <p:cNvPr id="2061" name="Rectangle 2060">
+            <a:extLst>
+              <a:ext uri="{FF2B5EF4-FFF2-40B4-BE49-F238E27FC236}">
+                <a16:creationId xmlns:a16="http://schemas.microsoft.com/office/drawing/2014/main" id="{102E1699-0830-EE28-6BA6-C87CE22D3610}"/>
               </a:ext>
               <a:ext uri="{C183D7F6-B498-43B3-948B-1728B52AA6E4}">
                 <adec:decorative xmlns:adec="http://schemas.microsoft.com/office/drawing/2017/decorative" val="1"/>
@@ -4102,8 +4199,8 @@
         </p:nvSpPr>
         <p:spPr>
           <a:xfrm>
-            <a:off x="1" y="3737234"/>
-            <a:ext cx="12192000" cy="3120318"/>
+            <a:off x="6096000" y="3229317"/>
+            <a:ext cx="6096000" cy="3640219"/>
           </a:xfrm>
           <a:prstGeom prst="rect">
             <a:avLst/>
@@ -4151,7 +4248,7 @@
           <a:lstStyle/>
           <a:p>
             <a:pPr algn="ctr"/>
-            <a:endParaRPr lang="en-US"/>
+            <a:endParaRPr lang="en-US" dirty="0"/>
           </a:p>
         </p:txBody>
       </p:sp>
@@ -4160,7 +4257,7 @@
           <p:cNvPr id="3" name="Content Placeholder 2">
             <a:extLst>
               <a:ext uri="{FF2B5EF4-FFF2-40B4-BE49-F238E27FC236}">
-                <a16:creationId xmlns:a16="http://schemas.microsoft.com/office/drawing/2014/main" id="{BA92B87A-E17C-60DC-471C-F580BD0156B6}"/>
+                <a16:creationId xmlns:a16="http://schemas.microsoft.com/office/drawing/2014/main" id="{14A92676-FF6A-147E-B2BE-4374B3BD51BC}"/>
               </a:ext>
             </a:extLst>
           </p:cNvPr>
@@ -4173,8 +4270,8 @@
         </p:nvSpPr>
         <p:spPr>
           <a:xfrm>
-            <a:off x="952500" y="2285997"/>
-            <a:ext cx="4191000" cy="3890965"/>
+            <a:off x="7038168" y="2286000"/>
+            <a:ext cx="4205849" cy="3810000"/>
           </a:xfrm>
         </p:spPr>
         <p:txBody>
@@ -4183,56 +4280,52 @@
           </a:bodyPr>
           <a:lstStyle/>
           <a:p>
-            <a:r>
-              <a:rPr lang="en-US" dirty="0"/>
-              <a:t>Very good feedback.</a:t>
-            </a:r>
-          </a:p>
-          <a:p>
-            <a:r>
-              <a:rPr lang="en-US" dirty="0"/>
-              <a:t>Very close to completion.</a:t>
-            </a:r>
-          </a:p>
-          <a:p>
-            <a:endParaRPr lang="en-US" dirty="0"/>
-          </a:p>
-        </p:txBody>
-      </p:sp>
-      <p:pic>
-        <p:nvPicPr>
-          <p:cNvPr id="5" name="Picture 4">
-            <a:extLst>
-              <a:ext uri="{FF2B5EF4-FFF2-40B4-BE49-F238E27FC236}">
-                <a16:creationId xmlns:a16="http://schemas.microsoft.com/office/drawing/2014/main" id="{C5CF7A84-431D-AB37-BF5F-AE206F3EECE4}"/>
-              </a:ext>
-            </a:extLst>
-          </p:cNvPr>
-          <p:cNvPicPr>
-            <a:picLocks noChangeAspect="1"/>
-          </p:cNvPicPr>
-          <p:nvPr/>
-        </p:nvPicPr>
-        <p:blipFill>
-          <a:blip r:embed="rId2"/>
-          <a:stretch>
-            <a:fillRect/>
-          </a:stretch>
-        </p:blipFill>
-        <p:spPr>
-          <a:xfrm>
-            <a:off x="6322521" y="1769246"/>
-            <a:ext cx="4708521" cy="3319507"/>
-          </a:xfrm>
-          <a:prstGeom prst="rect">
-            <a:avLst/>
-          </a:prstGeom>
-        </p:spPr>
-      </p:pic>
+            <a:pPr marL="0" indent="0">
+              <a:buNone/>
+            </a:pPr>
+            <a:r>
+              <a:rPr lang="en-US" dirty="0"/>
+              <a:t>A </a:t>
+            </a:r>
+            <a:r>
+              <a:rPr lang="en-US" b="1" dirty="0"/>
+              <a:t>serious simulation game </a:t>
+            </a:r>
+            <a:r>
+              <a:rPr lang="en-US" dirty="0"/>
+              <a:t>inspired by </a:t>
+            </a:r>
+            <a:r>
+              <a:rPr lang="en-US" dirty="0" err="1"/>
+              <a:t>RimWorld</a:t>
+            </a:r>
+            <a:r>
+              <a:rPr lang="en-US" dirty="0"/>
+              <a:t>/Dwarf Fortress in a First-Person perspective that will </a:t>
+            </a:r>
+            <a:r>
+              <a:rPr lang="en-US" b="1" dirty="0"/>
+              <a:t>help teach Students of Health and Wellbeing </a:t>
+            </a:r>
+            <a:r>
+              <a:rPr lang="en-US" dirty="0"/>
+              <a:t>(future caretakers) about </a:t>
+            </a:r>
+            <a:r>
+              <a:rPr lang="en-US" b="1" dirty="0"/>
+              <a:t>using caretaker technology </a:t>
+            </a:r>
+            <a:r>
+              <a:rPr lang="en-US" dirty="0"/>
+              <a:t>in a “normal day at the job” way.</a:t>
+            </a:r>
+          </a:p>
+        </p:txBody>
+      </p:sp>
     </p:spTree>
     <p:extLst>
       <p:ext uri="{BB962C8B-B14F-4D97-AF65-F5344CB8AC3E}">
-        <p14:creationId xmlns:p14="http://schemas.microsoft.com/office/powerpoint/2010/main" val="4078057596"/>
+        <p14:creationId xmlns:p14="http://schemas.microsoft.com/office/powerpoint/2010/main" val="4214049272"/>
       </p:ext>
     </p:extLst>
   </p:cSld>
@@ -4269,7 +4362,7 @@
       </p:grpSpPr>
       <p:sp useBgFill="1">
         <p:nvSpPr>
-          <p:cNvPr id="46" name="Rectangle 45">
+          <p:cNvPr id="10" name="Rectangle 9">
             <a:extLst>
               <a:ext uri="{FF2B5EF4-FFF2-40B4-BE49-F238E27FC236}">
                 <a16:creationId xmlns:a16="http://schemas.microsoft.com/office/drawing/2014/main" id="{D70BC64E-B094-49DE-BD9C-DB662FCF598F}"/>
@@ -4348,7 +4441,7 @@
           <p:cNvPr id="2" name="Title 1">
             <a:extLst>
               <a:ext uri="{FF2B5EF4-FFF2-40B4-BE49-F238E27FC236}">
-                <a16:creationId xmlns:a16="http://schemas.microsoft.com/office/drawing/2014/main" id="{FD54143B-0A98-AEA8-1881-37A5B4F5BD38}"/>
+                <a16:creationId xmlns:a16="http://schemas.microsoft.com/office/drawing/2014/main" id="{3D1A1391-78CF-F967-6838-FDEBD8EDAC5A}"/>
               </a:ext>
             </a:extLst>
           </p:cNvPr>
@@ -4361,26 +4454,26 @@
         </p:nvSpPr>
         <p:spPr>
           <a:xfrm>
-            <a:off x="6776349" y="541856"/>
+            <a:off x="952500" y="723900"/>
             <a:ext cx="4417522" cy="1181100"/>
           </a:xfrm>
         </p:spPr>
         <p:txBody>
-          <a:bodyPr vert="horz" lIns="91440" tIns="45720" rIns="91440" bIns="45720" rtlCol="0">
+          <a:bodyPr>
             <a:normAutofit/>
           </a:bodyPr>
           <a:lstStyle/>
           <a:p>
             <a:r>
               <a:rPr lang="en-US" dirty="0"/>
-              <a:t>Portfolio</a:t>
-            </a:r>
-          </a:p>
-        </p:txBody>
-      </p:sp>
-      <p:sp>
-        <p:nvSpPr>
-          <p:cNvPr id="48" name="Rectangle 47">
+              <a:t>Project plan</a:t>
+            </a:r>
+          </a:p>
+        </p:txBody>
+      </p:sp>
+      <p:sp>
+        <p:nvSpPr>
+          <p:cNvPr id="12" name="Rectangle 11">
             <a:extLst>
               <a:ext uri="{FF2B5EF4-FFF2-40B4-BE49-F238E27FC236}">
                 <a16:creationId xmlns:a16="http://schemas.microsoft.com/office/drawing/2014/main" id="{A718E0F5-1EF3-64D6-0802-B7983AC63269}"/>
@@ -4458,10 +4551,10 @@
       </p:sp>
       <p:sp>
         <p:nvSpPr>
-          <p:cNvPr id="7" name="Content Placeholder 6">
-            <a:extLst>
-              <a:ext uri="{FF2B5EF4-FFF2-40B4-BE49-F238E27FC236}">
-                <a16:creationId xmlns:a16="http://schemas.microsoft.com/office/drawing/2014/main" id="{7A2F2C72-ED71-6DBC-4FD3-6F44601588A2}"/>
+          <p:cNvPr id="3" name="Content Placeholder 2">
+            <a:extLst>
+              <a:ext uri="{FF2B5EF4-FFF2-40B4-BE49-F238E27FC236}">
+                <a16:creationId xmlns:a16="http://schemas.microsoft.com/office/drawing/2014/main" id="{BA92B87A-E17C-60DC-471C-F580BD0156B6}"/>
               </a:ext>
             </a:extLst>
           </p:cNvPr>
@@ -4474,7 +4567,7 @@
         </p:nvSpPr>
         <p:spPr>
           <a:xfrm>
-            <a:off x="6606668" y="2264812"/>
+            <a:off x="952500" y="2285997"/>
             <a:ext cx="4191000" cy="3890965"/>
           </a:xfrm>
         </p:spPr>
@@ -4486,35 +4579,26 @@
           <a:p>
             <a:r>
               <a:rPr lang="en-US" dirty="0"/>
-              <a:t>Reading guide complete.</a:t>
-            </a:r>
-          </a:p>
-          <a:p>
-            <a:r>
-              <a:rPr lang="en-US" dirty="0"/>
-              <a:t>Good feedback on organization.</a:t>
-            </a:r>
-          </a:p>
-          <a:p>
-            <a:r>
-              <a:rPr lang="en-US" dirty="0"/>
-              <a:t>Started working on first sub-question :”What makes a game educational?”.</a:t>
-            </a:r>
-          </a:p>
-          <a:p>
-            <a:pPr marL="0" indent="0">
-              <a:buNone/>
-            </a:pPr>
+              <a:t>Very good feedback.</a:t>
+            </a:r>
+          </a:p>
+          <a:p>
+            <a:r>
+              <a:rPr lang="en-US" dirty="0"/>
+              <a:t>Very close to completion.</a:t>
+            </a:r>
+          </a:p>
+          <a:p>
             <a:endParaRPr lang="en-US" dirty="0"/>
           </a:p>
         </p:txBody>
       </p:sp>
       <p:pic>
         <p:nvPicPr>
-          <p:cNvPr id="13" name="Picture 12">
-            <a:extLst>
-              <a:ext uri="{FF2B5EF4-FFF2-40B4-BE49-F238E27FC236}">
-                <a16:creationId xmlns:a16="http://schemas.microsoft.com/office/drawing/2014/main" id="{5B91367D-33FE-520F-8C58-1985D6C3D7A2}"/>
+          <p:cNvPr id="5" name="Picture 4">
+            <a:extLst>
+              <a:ext uri="{FF2B5EF4-FFF2-40B4-BE49-F238E27FC236}">
+                <a16:creationId xmlns:a16="http://schemas.microsoft.com/office/drawing/2014/main" id="{C5CF7A84-431D-AB37-BF5F-AE206F3EECE4}"/>
               </a:ext>
             </a:extLst>
           </p:cNvPr>
@@ -4531,8 +4615,8 @@
         </p:blipFill>
         <p:spPr>
           <a:xfrm>
-            <a:off x="683460" y="1132406"/>
-            <a:ext cx="3800862" cy="4593188"/>
+            <a:off x="6322521" y="1769246"/>
+            <a:ext cx="4708521" cy="3319507"/>
           </a:xfrm>
           <a:prstGeom prst="rect">
             <a:avLst/>
@@ -4542,7 +4626,7 @@
     </p:spTree>
     <p:extLst>
       <p:ext uri="{BB962C8B-B14F-4D97-AF65-F5344CB8AC3E}">
-        <p14:creationId xmlns:p14="http://schemas.microsoft.com/office/powerpoint/2010/main" val="3448015517"/>
+        <p14:creationId xmlns:p14="http://schemas.microsoft.com/office/powerpoint/2010/main" val="4078057596"/>
       </p:ext>
     </p:extLst>
   </p:cSld>
@@ -4579,10 +4663,10 @@
       </p:grpSpPr>
       <p:sp useBgFill="1">
         <p:nvSpPr>
-          <p:cNvPr id="10" name="Rectangle 9">
-            <a:extLst>
-              <a:ext uri="{FF2B5EF4-FFF2-40B4-BE49-F238E27FC236}">
-                <a16:creationId xmlns:a16="http://schemas.microsoft.com/office/drawing/2014/main" id="{3DAD064D-86F0-42ED-B520-99689857918E}"/>
+          <p:cNvPr id="46" name="Rectangle 45">
+            <a:extLst>
+              <a:ext uri="{FF2B5EF4-FFF2-40B4-BE49-F238E27FC236}">
+                <a16:creationId xmlns:a16="http://schemas.microsoft.com/office/drawing/2014/main" id="{D70BC64E-B094-49DE-BD9C-DB662FCF598F}"/>
               </a:ext>
               <a:ext uri="{C183D7F6-B498-43B3-948B-1728B52AA6E4}">
                 <adec:decorative xmlns:adec="http://schemas.microsoft.com/office/drawing/2017/decorative" val="1"/>
@@ -4658,7 +4742,7 @@
           <p:cNvPr id="2" name="Title 1">
             <a:extLst>
               <a:ext uri="{FF2B5EF4-FFF2-40B4-BE49-F238E27FC236}">
-                <a16:creationId xmlns:a16="http://schemas.microsoft.com/office/drawing/2014/main" id="{9EDADDD5-D395-0754-5F11-1658946A4CDE}"/>
+                <a16:creationId xmlns:a16="http://schemas.microsoft.com/office/drawing/2014/main" id="{FD54143B-0A98-AEA8-1881-37A5B4F5BD38}"/>
               </a:ext>
             </a:extLst>
           </p:cNvPr>
@@ -4671,29 +4755,29 @@
         </p:nvSpPr>
         <p:spPr>
           <a:xfrm>
-            <a:off x="952500" y="812042"/>
-            <a:ext cx="4264686" cy="1092958"/>
-          </a:xfrm>
-        </p:spPr>
-        <p:txBody>
-          <a:bodyPr>
-            <a:normAutofit fontScale="90000"/>
+            <a:off x="6776349" y="541856"/>
+            <a:ext cx="4417522" cy="1181100"/>
+          </a:xfrm>
+        </p:spPr>
+        <p:txBody>
+          <a:bodyPr vert="horz" lIns="91440" tIns="45720" rIns="91440" bIns="45720" rtlCol="0">
+            <a:normAutofit/>
           </a:bodyPr>
           <a:lstStyle/>
           <a:p>
             <a:r>
               <a:rPr lang="en-US" dirty="0"/>
-              <a:t>(already owned) Assets and a bit of research</a:t>
-            </a:r>
-          </a:p>
-        </p:txBody>
-      </p:sp>
-      <p:sp>
-        <p:nvSpPr>
-          <p:cNvPr id="12" name="Rectangle 11">
-            <a:extLst>
-              <a:ext uri="{FF2B5EF4-FFF2-40B4-BE49-F238E27FC236}">
-                <a16:creationId xmlns:a16="http://schemas.microsoft.com/office/drawing/2014/main" id="{17A4D85E-F98A-F670-16C3-7B2B0DA3A0DA}"/>
+              <a:t>Portfolio</a:t>
+            </a:r>
+          </a:p>
+        </p:txBody>
+      </p:sp>
+      <p:sp>
+        <p:nvSpPr>
+          <p:cNvPr id="48" name="Rectangle 47">
+            <a:extLst>
+              <a:ext uri="{FF2B5EF4-FFF2-40B4-BE49-F238E27FC236}">
+                <a16:creationId xmlns:a16="http://schemas.microsoft.com/office/drawing/2014/main" id="{A718E0F5-1EF3-64D6-0802-B7983AC63269}"/>
               </a:ext>
               <a:ext uri="{C183D7F6-B498-43B3-948B-1728B52AA6E4}">
                 <adec:decorative xmlns:adec="http://schemas.microsoft.com/office/drawing/2017/decorative" val="1"/>
@@ -4713,8 +4797,8 @@
         </p:nvSpPr>
         <p:spPr>
           <a:xfrm>
-            <a:off x="0" y="3217781"/>
-            <a:ext cx="6096000" cy="3640219"/>
+            <a:off x="1" y="3737234"/>
+            <a:ext cx="12192000" cy="3120318"/>
           </a:xfrm>
           <a:prstGeom prst="rect">
             <a:avLst/>
@@ -4762,16 +4846,16 @@
           <a:lstStyle/>
           <a:p>
             <a:pPr algn="ctr"/>
-            <a:endParaRPr lang="en-US" dirty="0"/>
-          </a:p>
-        </p:txBody>
-      </p:sp>
-      <p:sp>
-        <p:nvSpPr>
-          <p:cNvPr id="3" name="Content Placeholder 2">
-            <a:extLst>
-              <a:ext uri="{FF2B5EF4-FFF2-40B4-BE49-F238E27FC236}">
-                <a16:creationId xmlns:a16="http://schemas.microsoft.com/office/drawing/2014/main" id="{6B034B1B-3FE2-8173-7E88-35B01A9E2E59}"/>
+            <a:endParaRPr lang="en-US"/>
+          </a:p>
+        </p:txBody>
+      </p:sp>
+      <p:sp>
+        <p:nvSpPr>
+          <p:cNvPr id="7" name="Content Placeholder 6">
+            <a:extLst>
+              <a:ext uri="{FF2B5EF4-FFF2-40B4-BE49-F238E27FC236}">
+                <a16:creationId xmlns:a16="http://schemas.microsoft.com/office/drawing/2014/main" id="{7A2F2C72-ED71-6DBC-4FD3-6F44601588A2}"/>
               </a:ext>
             </a:extLst>
           </p:cNvPr>
@@ -4784,7 +4868,7 @@
         </p:nvSpPr>
         <p:spPr>
           <a:xfrm>
-            <a:off x="952500" y="2285997"/>
+            <a:off x="6606668" y="2264812"/>
             <a:ext cx="4191000" cy="3890965"/>
           </a:xfrm>
         </p:spPr>
@@ -4796,23 +4880,35 @@
           <a:p>
             <a:r>
               <a:rPr lang="en-US" dirty="0"/>
-              <a:t>Started researching about assets/packages that can help make the development faster/easier.</a:t>
-            </a:r>
-          </a:p>
-          <a:p>
-            <a:r>
-              <a:rPr lang="en-US" dirty="0"/>
-              <a:t>Prototyped multiple assets/packages, narrowed it down to a handful that can help me (not representative in the image)</a:t>
-            </a:r>
+              <a:t>Reading guide complete.</a:t>
+            </a:r>
+          </a:p>
+          <a:p>
+            <a:r>
+              <a:rPr lang="en-US" dirty="0"/>
+              <a:t>Good feedback on organization.</a:t>
+            </a:r>
+          </a:p>
+          <a:p>
+            <a:r>
+              <a:rPr lang="en-US" dirty="0"/>
+              <a:t>Started working on first sub-question :”What makes a game educational?”.</a:t>
+            </a:r>
+          </a:p>
+          <a:p>
+            <a:pPr marL="0" indent="0">
+              <a:buNone/>
+            </a:pPr>
+            <a:endParaRPr lang="en-US" dirty="0"/>
           </a:p>
         </p:txBody>
       </p:sp>
       <p:pic>
         <p:nvPicPr>
-          <p:cNvPr id="5" name="Picture 4">
-            <a:extLst>
-              <a:ext uri="{FF2B5EF4-FFF2-40B4-BE49-F238E27FC236}">
-                <a16:creationId xmlns:a16="http://schemas.microsoft.com/office/drawing/2014/main" id="{22912D1C-9F23-213C-7F94-0BFDB8DE60FE}"/>
+          <p:cNvPr id="13" name="Picture 12">
+            <a:extLst>
+              <a:ext uri="{FF2B5EF4-FFF2-40B4-BE49-F238E27FC236}">
+                <a16:creationId xmlns:a16="http://schemas.microsoft.com/office/drawing/2014/main" id="{5B91367D-33FE-520F-8C58-1985D6C3D7A2}"/>
               </a:ext>
             </a:extLst>
           </p:cNvPr>
@@ -4821,15 +4917,16 @@
           </p:cNvPicPr>
           <p:nvPr/>
         </p:nvPicPr>
-        <p:blipFill rotWithShape="1">
+        <p:blipFill>
           <a:blip r:embed="rId2"/>
-          <a:srcRect r="25557" b="2"/>
-          <a:stretch/>
+          <a:stretch>
+            <a:fillRect/>
+          </a:stretch>
         </p:blipFill>
         <p:spPr>
           <a:xfrm>
-            <a:off x="6096000" y="10"/>
-            <a:ext cx="6095999" cy="6857990"/>
+            <a:off x="683460" y="1132406"/>
+            <a:ext cx="3800862" cy="4593188"/>
           </a:xfrm>
           <a:prstGeom prst="rect">
             <a:avLst/>
@@ -4839,7 +4936,7 @@
     </p:spTree>
     <p:extLst>
       <p:ext uri="{BB962C8B-B14F-4D97-AF65-F5344CB8AC3E}">
-        <p14:creationId xmlns:p14="http://schemas.microsoft.com/office/powerpoint/2010/main" val="3081187274"/>
+        <p14:creationId xmlns:p14="http://schemas.microsoft.com/office/powerpoint/2010/main" val="3448015517"/>
       </p:ext>
     </p:extLst>
   </p:cSld>
@@ -4876,7 +4973,7 @@
       </p:grpSpPr>
       <p:sp useBgFill="1">
         <p:nvSpPr>
-          <p:cNvPr id="21" name="Rectangle 20">
+          <p:cNvPr id="3098" name="Rectangle 3082">
             <a:extLst>
               <a:ext uri="{FF2B5EF4-FFF2-40B4-BE49-F238E27FC236}">
                 <a16:creationId xmlns:a16="http://schemas.microsoft.com/office/drawing/2014/main" id="{D70BC64E-B094-49DE-BD9C-DB662FCF598F}"/>
@@ -4955,7 +5052,7 @@
           <p:cNvPr id="2" name="Title 1">
             <a:extLst>
               <a:ext uri="{FF2B5EF4-FFF2-40B4-BE49-F238E27FC236}">
-                <a16:creationId xmlns:a16="http://schemas.microsoft.com/office/drawing/2014/main" id="{BC738E08-91ED-FBA6-25F9-4DD025C05AE5}"/>
+                <a16:creationId xmlns:a16="http://schemas.microsoft.com/office/drawing/2014/main" id="{BC08A860-6E51-C699-247A-5F52D82DBCB9}"/>
               </a:ext>
             </a:extLst>
           </p:cNvPr>
@@ -4968,8 +5065,8 @@
         </p:nvSpPr>
         <p:spPr>
           <a:xfrm>
-            <a:off x="6413912" y="687517"/>
-            <a:ext cx="4417522" cy="1181100"/>
+            <a:off x="952500" y="914400"/>
+            <a:ext cx="4731923" cy="990600"/>
           </a:xfrm>
         </p:spPr>
         <p:txBody>
@@ -4980,14 +5077,14 @@
           <a:p>
             <a:r>
               <a:rPr lang="en-US" dirty="0"/>
-              <a:t>Development</a:t>
-            </a:r>
-          </a:p>
-        </p:txBody>
-      </p:sp>
-      <p:sp>
-        <p:nvSpPr>
-          <p:cNvPr id="23" name="Rectangle 22">
+              <a:t>Pipeline</a:t>
+            </a:r>
+          </a:p>
+        </p:txBody>
+      </p:sp>
+      <p:sp>
+        <p:nvSpPr>
+          <p:cNvPr id="3099" name="Rectangle 3084">
             <a:extLst>
               <a:ext uri="{FF2B5EF4-FFF2-40B4-BE49-F238E27FC236}">
                 <a16:creationId xmlns:a16="http://schemas.microsoft.com/office/drawing/2014/main" id="{A718E0F5-1EF3-64D6-0802-B7983AC63269}"/>
@@ -5065,10 +5162,10 @@
       </p:sp>
       <p:sp>
         <p:nvSpPr>
-          <p:cNvPr id="9" name="Content Placeholder 8">
-            <a:extLst>
-              <a:ext uri="{FF2B5EF4-FFF2-40B4-BE49-F238E27FC236}">
-                <a16:creationId xmlns:a16="http://schemas.microsoft.com/office/drawing/2014/main" id="{5E018B7D-5487-FF03-3FC4-0DFB7A57D655}"/>
+          <p:cNvPr id="3" name="Content Placeholder 2">
+            <a:extLst>
+              <a:ext uri="{FF2B5EF4-FFF2-40B4-BE49-F238E27FC236}">
+                <a16:creationId xmlns:a16="http://schemas.microsoft.com/office/drawing/2014/main" id="{A2479E17-7DAF-88EA-808F-C1195E3BF96C}"/>
               </a:ext>
             </a:extLst>
           </p:cNvPr>
@@ -5081,8 +5178,8 @@
         </p:nvSpPr>
         <p:spPr>
           <a:xfrm>
-            <a:off x="6413912" y="2158012"/>
-            <a:ext cx="4191000" cy="3890965"/>
+            <a:off x="952500" y="2285997"/>
+            <a:ext cx="4731923" cy="3890965"/>
           </a:xfrm>
         </p:spPr>
         <p:txBody>
@@ -5093,50 +5190,165 @@
           <a:p>
             <a:r>
               <a:rPr lang="en-US" dirty="0"/>
-              <a:t>Started working on AI</a:t>
-            </a:r>
-          </a:p>
-          <a:p>
-            <a:r>
-              <a:rPr lang="en-US" dirty="0"/>
-              <a:t>Implemented assets/packages that will help with development</a:t>
+              <a:t>GitHub set up and running (already using)</a:t>
+            </a:r>
+          </a:p>
+          <a:p>
+            <a:r>
+              <a:rPr lang="en-US" dirty="0"/>
+              <a:t>Trello set up in SCRUM style.</a:t>
+            </a:r>
+          </a:p>
+          <a:p>
+            <a:r>
+              <a:rPr lang="en-US" dirty="0"/>
+              <a:t>Sprint definition complete.</a:t>
             </a:r>
           </a:p>
         </p:txBody>
       </p:sp>
       <p:pic>
         <p:nvPicPr>
-          <p:cNvPr id="5" name="Content Placeholder 4">
-            <a:extLst>
-              <a:ext uri="{FF2B5EF4-FFF2-40B4-BE49-F238E27FC236}">
-                <a16:creationId xmlns:a16="http://schemas.microsoft.com/office/drawing/2014/main" id="{02969C9C-001D-434F-4CCE-7EE5A9CDF169}"/>
+          <p:cNvPr id="3076" name="Picture 4" descr="Download Trello Logo in SVG Vector or PNG File Format - Logo ...">
+            <a:extLst>
+              <a:ext uri="{FF2B5EF4-FFF2-40B4-BE49-F238E27FC236}">
+                <a16:creationId xmlns:a16="http://schemas.microsoft.com/office/drawing/2014/main" id="{84D161D3-B029-98C7-2EB4-18A6BEA64A57}"/>
               </a:ext>
             </a:extLst>
           </p:cNvPr>
           <p:cNvPicPr>
-            <a:picLocks noChangeAspect="1"/>
+            <a:picLocks noChangeAspect="1" noChangeArrowheads="1"/>
           </p:cNvPicPr>
           <p:nvPr/>
         </p:nvPicPr>
-        <p:blipFill rotWithShape="1">
-          <a:blip r:embed="rId2"/>
-          <a:srcRect l="24718" r="20616"/>
-          <a:stretch/>
+        <p:blipFill>
+          <a:blip r:embed="rId2">
+            <a:extLst>
+              <a:ext uri="{28A0092B-C50C-407E-A947-70E740481C1C}">
+                <a14:useLocalDpi xmlns:a14="http://schemas.microsoft.com/office/drawing/2010/main" val="0"/>
+              </a:ext>
+            </a:extLst>
+          </a:blip>
+          <a:stretch>
+            <a:fillRect/>
+          </a:stretch>
         </p:blipFill>
-        <p:spPr>
-          <a:xfrm>
-            <a:off x="402998" y="1278067"/>
-            <a:ext cx="4082783" cy="4593188"/>
+        <p:spPr bwMode="auto">
+          <a:xfrm>
+            <a:off x="6698954" y="1862476"/>
+            <a:ext cx="2122424" cy="1414949"/>
           </a:xfrm>
           <a:prstGeom prst="rect">
             <a:avLst/>
           </a:prstGeom>
+          <a:noFill/>
+          <a:extLst>
+            <a:ext uri="{909E8E84-426E-40DD-AFC4-6F175D3DCCD1}">
+              <a14:hiddenFill xmlns:a14="http://schemas.microsoft.com/office/drawing/2010/main">
+                <a:solidFill>
+                  <a:srgbClr val="FFFFFF"/>
+                </a:solidFill>
+              </a14:hiddenFill>
+            </a:ext>
+          </a:extLst>
+        </p:spPr>
+      </p:pic>
+      <p:pic>
+        <p:nvPicPr>
+          <p:cNvPr id="3074" name="Picture 2" descr="GitHub Logo and symbol, meaning, history, PNG, brand">
+            <a:extLst>
+              <a:ext uri="{FF2B5EF4-FFF2-40B4-BE49-F238E27FC236}">
+                <a16:creationId xmlns:a16="http://schemas.microsoft.com/office/drawing/2014/main" id="{AE357A19-1A11-DF79-364D-76D120898B73}"/>
+              </a:ext>
+            </a:extLst>
+          </p:cNvPr>
+          <p:cNvPicPr>
+            <a:picLocks noChangeAspect="1" noChangeArrowheads="1"/>
+          </p:cNvPicPr>
+          <p:nvPr/>
+        </p:nvPicPr>
+        <p:blipFill>
+          <a:blip r:embed="rId3">
+            <a:extLst>
+              <a:ext uri="{28A0092B-C50C-407E-A947-70E740481C1C}">
+                <a14:useLocalDpi xmlns:a14="http://schemas.microsoft.com/office/drawing/2010/main" val="0"/>
+              </a:ext>
+            </a:extLst>
+          </a:blip>
+          <a:stretch>
+            <a:fillRect/>
+          </a:stretch>
+        </p:blipFill>
+        <p:spPr bwMode="auto">
+          <a:xfrm>
+            <a:off x="9110754" y="2070714"/>
+            <a:ext cx="2128745" cy="1197419"/>
+          </a:xfrm>
+          <a:prstGeom prst="rect">
+            <a:avLst/>
+          </a:prstGeom>
+          <a:noFill/>
+          <a:extLst>
+            <a:ext uri="{909E8E84-426E-40DD-AFC4-6F175D3DCCD1}">
+              <a14:hiddenFill xmlns:a14="http://schemas.microsoft.com/office/drawing/2010/main">
+                <a:solidFill>
+                  <a:srgbClr val="FFFFFF"/>
+                </a:solidFill>
+              </a14:hiddenFill>
+            </a:ext>
+          </a:extLst>
+        </p:spPr>
+      </p:pic>
+      <p:pic>
+        <p:nvPicPr>
+          <p:cNvPr id="3078" name="Picture 6" descr="What is Scrum? | Scrum.org">
+            <a:extLst>
+              <a:ext uri="{FF2B5EF4-FFF2-40B4-BE49-F238E27FC236}">
+                <a16:creationId xmlns:a16="http://schemas.microsoft.com/office/drawing/2014/main" id="{483375BA-6157-15C4-A676-7993894A6820}"/>
+              </a:ext>
+            </a:extLst>
+          </p:cNvPr>
+          <p:cNvPicPr>
+            <a:picLocks noChangeAspect="1" noChangeArrowheads="1"/>
+          </p:cNvPicPr>
+          <p:nvPr/>
+        </p:nvPicPr>
+        <p:blipFill>
+          <a:blip r:embed="rId4">
+            <a:extLst>
+              <a:ext uri="{28A0092B-C50C-407E-A947-70E740481C1C}">
+                <a14:useLocalDpi xmlns:a14="http://schemas.microsoft.com/office/drawing/2010/main" val="0"/>
+              </a:ext>
+            </a:extLst>
+          </a:blip>
+          <a:stretch>
+            <a:fillRect/>
+          </a:stretch>
+        </p:blipFill>
+        <p:spPr bwMode="auto">
+          <a:xfrm>
+            <a:off x="6698954" y="3589867"/>
+            <a:ext cx="4540546" cy="2156759"/>
+          </a:xfrm>
+          <a:prstGeom prst="rect">
+            <a:avLst/>
+          </a:prstGeom>
+          <a:noFill/>
+          <a:extLst>
+            <a:ext uri="{909E8E84-426E-40DD-AFC4-6F175D3DCCD1}">
+              <a14:hiddenFill xmlns:a14="http://schemas.microsoft.com/office/drawing/2010/main">
+                <a:solidFill>
+                  <a:srgbClr val="FFFFFF"/>
+                </a:solidFill>
+              </a14:hiddenFill>
+            </a:ext>
+          </a:extLst>
         </p:spPr>
       </p:pic>
     </p:spTree>
     <p:extLst>
       <p:ext uri="{BB962C8B-B14F-4D97-AF65-F5344CB8AC3E}">
-        <p14:creationId xmlns:p14="http://schemas.microsoft.com/office/powerpoint/2010/main" val="2739513423"/>
+        <p14:creationId xmlns:p14="http://schemas.microsoft.com/office/powerpoint/2010/main" val="165288482"/>
       </p:ext>
     </p:extLst>
   </p:cSld>
@@ -5171,6 +5383,650 @@
           <a:chExt cx="0" cy="0"/>
         </a:xfrm>
       </p:grpSpPr>
+      <p:sp useBgFill="1">
+        <p:nvSpPr>
+          <p:cNvPr id="1035" name="Rectangle 1030">
+            <a:extLst>
+              <a:ext uri="{FF2B5EF4-FFF2-40B4-BE49-F238E27FC236}">
+                <a16:creationId xmlns:a16="http://schemas.microsoft.com/office/drawing/2014/main" id="{9184DF83-39E6-4BDC-9E23-17F25AB44C55}"/>
+              </a:ext>
+              <a:ext uri="{C183D7F6-B498-43B3-948B-1728B52AA6E4}">
+                <adec:decorative xmlns:adec="http://schemas.microsoft.com/office/drawing/2017/decorative" val="1"/>
+              </a:ext>
+            </a:extLst>
+          </p:cNvPr>
+          <p:cNvSpPr>
+            <a:spLocks noGrp="1" noRot="1" noChangeAspect="1" noMove="1" noResize="1" noEditPoints="1" noAdjustHandles="1" noChangeArrowheads="1" noChangeShapeType="1" noTextEdit="1"/>
+          </p:cNvSpPr>
+          <p:nvPr>
+            <p:extLst>
+              <p:ext uri="{386F3935-93C4-4BCD-93E2-E3B085C9AB24}">
+                <p16:designElem xmlns:p16="http://schemas.microsoft.com/office/powerpoint/2015/main" val="1"/>
+              </p:ext>
+            </p:extLst>
+          </p:nvPr>
+        </p:nvSpPr>
+        <p:spPr>
+          <a:xfrm>
+            <a:off x="0" y="0"/>
+            <a:ext cx="12192000" cy="6858000"/>
+          </a:xfrm>
+          <a:prstGeom prst="rect">
+            <a:avLst/>
+          </a:prstGeom>
+          <a:ln w="12700" cap="flat" cmpd="sng" algn="ctr">
+            <a:noFill/>
+            <a:prstDash val="solid"/>
+            <a:miter lim="800000"/>
+          </a:ln>
+          <a:effectLst/>
+          <a:extLst>
+            <a:ext uri="{91240B29-F687-4F45-9708-019B960494DF}">
+              <a14:hiddenLine xmlns:a14="http://schemas.microsoft.com/office/drawing/2010/main" w="12700" cap="flat" cmpd="sng" algn="ctr">
+                <a:solidFill>
+                  <a:schemeClr val="accent1">
+                    <a:shade val="50000"/>
+                  </a:schemeClr>
+                </a:solidFill>
+                <a:prstDash val="solid"/>
+                <a:miter lim="800000"/>
+              </a14:hiddenLine>
+            </a:ext>
+          </a:extLst>
+        </p:spPr>
+        <p:style>
+          <a:lnRef idx="2">
+            <a:schemeClr val="accent1">
+              <a:shade val="50000"/>
+            </a:schemeClr>
+          </a:lnRef>
+          <a:fillRef idx="1">
+            <a:schemeClr val="accent1"/>
+          </a:fillRef>
+          <a:effectRef idx="0">
+            <a:schemeClr val="accent1"/>
+          </a:effectRef>
+          <a:fontRef idx="minor">
+            <a:schemeClr val="lt1"/>
+          </a:fontRef>
+        </p:style>
+        <p:txBody>
+          <a:bodyPr rtlCol="0" anchor="ctr"/>
+          <a:lstStyle/>
+          <a:p>
+            <a:pPr algn="ctr"/>
+            <a:endParaRPr lang="en-US"/>
+          </a:p>
+        </p:txBody>
+      </p:sp>
+      <p:sp>
+        <p:nvSpPr>
+          <p:cNvPr id="2" name="Title 1">
+            <a:extLst>
+              <a:ext uri="{FF2B5EF4-FFF2-40B4-BE49-F238E27FC236}">
+                <a16:creationId xmlns:a16="http://schemas.microsoft.com/office/drawing/2014/main" id="{9EDADDD5-D395-0754-5F11-1658946A4CDE}"/>
+              </a:ext>
+            </a:extLst>
+          </p:cNvPr>
+          <p:cNvSpPr>
+            <a:spLocks noGrp="1"/>
+          </p:cNvSpPr>
+          <p:nvPr>
+            <p:ph type="title"/>
+          </p:nvPr>
+        </p:nvSpPr>
+        <p:spPr>
+          <a:xfrm>
+            <a:off x="952500" y="914400"/>
+            <a:ext cx="4326082" cy="990600"/>
+          </a:xfrm>
+        </p:spPr>
+        <p:txBody>
+          <a:bodyPr>
+            <a:normAutofit/>
+          </a:bodyPr>
+          <a:lstStyle/>
+          <a:p>
+            <a:pPr>
+              <a:lnSpc>
+                <a:spcPct val="110000"/>
+              </a:lnSpc>
+            </a:pPr>
+            <a:r>
+              <a:rPr lang="en-US" sz="1800"/>
+              <a:t>(already owned) Assets and a bit of research</a:t>
+            </a:r>
+          </a:p>
+        </p:txBody>
+      </p:sp>
+      <p:sp>
+        <p:nvSpPr>
+          <p:cNvPr id="3" name="Content Placeholder 2">
+            <a:extLst>
+              <a:ext uri="{FF2B5EF4-FFF2-40B4-BE49-F238E27FC236}">
+                <a16:creationId xmlns:a16="http://schemas.microsoft.com/office/drawing/2014/main" id="{6B034B1B-3FE2-8173-7E88-35B01A9E2E59}"/>
+              </a:ext>
+            </a:extLst>
+          </p:cNvPr>
+          <p:cNvSpPr>
+            <a:spLocks noGrp="1"/>
+          </p:cNvSpPr>
+          <p:nvPr>
+            <p:ph idx="1"/>
+          </p:nvPr>
+        </p:nvSpPr>
+        <p:spPr>
+          <a:xfrm>
+            <a:off x="952500" y="2285997"/>
+            <a:ext cx="4191000" cy="3890965"/>
+          </a:xfrm>
+        </p:spPr>
+        <p:txBody>
+          <a:bodyPr>
+            <a:normAutofit/>
+          </a:bodyPr>
+          <a:lstStyle/>
+          <a:p>
+            <a:r>
+              <a:rPr lang="en-US" dirty="0"/>
+              <a:t>Started researching about assets/packages that can help make the development faster/easier.</a:t>
+            </a:r>
+          </a:p>
+          <a:p>
+            <a:r>
+              <a:rPr lang="en-US" dirty="0"/>
+              <a:t>Prototyped multiple assets/packages, narrowed it down to a handful that can help me</a:t>
+            </a:r>
+          </a:p>
+        </p:txBody>
+      </p:sp>
+      <p:pic>
+        <p:nvPicPr>
+          <p:cNvPr id="5" name="Picture 4">
+            <a:extLst>
+              <a:ext uri="{FF2B5EF4-FFF2-40B4-BE49-F238E27FC236}">
+                <a16:creationId xmlns:a16="http://schemas.microsoft.com/office/drawing/2014/main" id="{22912D1C-9F23-213C-7F94-0BFDB8DE60FE}"/>
+              </a:ext>
+            </a:extLst>
+          </p:cNvPr>
+          <p:cNvPicPr>
+            <a:picLocks noChangeAspect="1"/>
+          </p:cNvPicPr>
+          <p:nvPr/>
+        </p:nvPicPr>
+        <p:blipFill rotWithShape="1">
+          <a:blip r:embed="rId2"/>
+          <a:srcRect t="2378" b="30232"/>
+          <a:stretch/>
+        </p:blipFill>
+        <p:spPr>
+          <a:xfrm>
+            <a:off x="6096000" y="10"/>
+            <a:ext cx="6096000" cy="3440526"/>
+          </a:xfrm>
+          <a:prstGeom prst="rect">
+            <a:avLst/>
+          </a:prstGeom>
+        </p:spPr>
+      </p:pic>
+      <p:pic>
+        <p:nvPicPr>
+          <p:cNvPr id="1026" name="Picture 2" descr="screenshot">
+            <a:extLst>
+              <a:ext uri="{FF2B5EF4-FFF2-40B4-BE49-F238E27FC236}">
+                <a16:creationId xmlns:a16="http://schemas.microsoft.com/office/drawing/2014/main" id="{F4BA7A31-E34C-7078-DFD4-EBA477B04BAE}"/>
+              </a:ext>
+            </a:extLst>
+          </p:cNvPr>
+          <p:cNvPicPr>
+            <a:picLocks noChangeAspect="1" noChangeArrowheads="1"/>
+          </p:cNvPicPr>
+          <p:nvPr/>
+        </p:nvPicPr>
+        <p:blipFill rotWithShape="1">
+          <a:blip r:embed="rId3">
+            <a:extLst>
+              <a:ext uri="{28A0092B-C50C-407E-A947-70E740481C1C}">
+                <a14:useLocalDpi xmlns:a14="http://schemas.microsoft.com/office/drawing/2010/main" val="0"/>
+              </a:ext>
+            </a:extLst>
+          </a:blip>
+          <a:srcRect t="7205" b="8242"/>
+          <a:stretch/>
+        </p:blipFill>
+        <p:spPr bwMode="auto">
+          <a:xfrm>
+            <a:off x="6096000" y="3429000"/>
+            <a:ext cx="6096000" cy="3440536"/>
+          </a:xfrm>
+          <a:prstGeom prst="rect">
+            <a:avLst/>
+          </a:prstGeom>
+          <a:noFill/>
+          <a:extLst>
+            <a:ext uri="{909E8E84-426E-40DD-AFC4-6F175D3DCCD1}">
+              <a14:hiddenFill xmlns:a14="http://schemas.microsoft.com/office/drawing/2010/main">
+                <a:solidFill>
+                  <a:srgbClr val="FFFFFF"/>
+                </a:solidFill>
+              </a14:hiddenFill>
+            </a:ext>
+          </a:extLst>
+        </p:spPr>
+      </p:pic>
+      <p:sp>
+        <p:nvSpPr>
+          <p:cNvPr id="1036" name="Rectangle 1032">
+            <a:extLst>
+              <a:ext uri="{FF2B5EF4-FFF2-40B4-BE49-F238E27FC236}">
+                <a16:creationId xmlns:a16="http://schemas.microsoft.com/office/drawing/2014/main" id="{102E1699-0830-EE28-6BA6-C87CE22D3610}"/>
+              </a:ext>
+              <a:ext uri="{C183D7F6-B498-43B3-948B-1728B52AA6E4}">
+                <adec:decorative xmlns:adec="http://schemas.microsoft.com/office/drawing/2017/decorative" val="1"/>
+              </a:ext>
+            </a:extLst>
+          </p:cNvPr>
+          <p:cNvSpPr>
+            <a:spLocks noGrp="1" noRot="1" noChangeAspect="1" noMove="1" noResize="1" noEditPoints="1" noAdjustHandles="1" noChangeArrowheads="1" noChangeShapeType="1" noTextEdit="1"/>
+          </p:cNvSpPr>
+          <p:nvPr>
+            <p:extLst>
+              <p:ext uri="{386F3935-93C4-4BCD-93E2-E3B085C9AB24}">
+                <p16:designElem xmlns:p16="http://schemas.microsoft.com/office/powerpoint/2015/main" val="1"/>
+              </p:ext>
+            </p:extLst>
+          </p:nvPr>
+        </p:nvSpPr>
+        <p:spPr>
+          <a:xfrm>
+            <a:off x="6096000" y="3533220"/>
+            <a:ext cx="6096000" cy="3336316"/>
+          </a:xfrm>
+          <a:prstGeom prst="rect">
+            <a:avLst/>
+          </a:prstGeom>
+          <a:gradFill>
+            <a:gsLst>
+              <a:gs pos="10000">
+                <a:schemeClr val="accent1">
+                  <a:lumMod val="60000"/>
+                  <a:lumOff val="40000"/>
+                  <a:alpha val="0"/>
+                </a:schemeClr>
+              </a:gs>
+              <a:gs pos="100000">
+                <a:schemeClr val="accent1">
+                  <a:lumMod val="60000"/>
+                  <a:lumOff val="40000"/>
+                </a:schemeClr>
+              </a:gs>
+            </a:gsLst>
+            <a:lin ang="5400000" scaled="1"/>
+          </a:gradFill>
+          <a:ln>
+            <a:noFill/>
+          </a:ln>
+        </p:spPr>
+        <p:style>
+          <a:lnRef idx="2">
+            <a:schemeClr val="accent1">
+              <a:shade val="50000"/>
+            </a:schemeClr>
+          </a:lnRef>
+          <a:fillRef idx="1">
+            <a:schemeClr val="accent1"/>
+          </a:fillRef>
+          <a:effectRef idx="0">
+            <a:schemeClr val="accent1"/>
+          </a:effectRef>
+          <a:fontRef idx="minor">
+            <a:schemeClr val="lt1"/>
+          </a:fontRef>
+        </p:style>
+        <p:txBody>
+          <a:bodyPr rtlCol="0" anchor="ctr"/>
+          <a:lstStyle/>
+          <a:p>
+            <a:pPr algn="ctr"/>
+            <a:endParaRPr lang="en-US" dirty="0"/>
+          </a:p>
+        </p:txBody>
+      </p:sp>
+    </p:spTree>
+    <p:extLst>
+      <p:ext uri="{BB962C8B-B14F-4D97-AF65-F5344CB8AC3E}">
+        <p14:creationId xmlns:p14="http://schemas.microsoft.com/office/powerpoint/2010/main" val="3081187274"/>
+      </p:ext>
+    </p:extLst>
+  </p:cSld>
+  <p:clrMapOvr>
+    <a:masterClrMapping/>
+  </p:clrMapOvr>
+</p:sld>
+</file>
+
+<file path=ppt/slides/slide7.xml><?xml version="1.0" encoding="utf-8"?>
+<p:sld xmlns:a="http://schemas.openxmlformats.org/drawingml/2006/main" xmlns:r="http://schemas.openxmlformats.org/officeDocument/2006/relationships" xmlns:p="http://schemas.openxmlformats.org/presentationml/2006/main">
+  <p:cSld>
+    <p:bg>
+      <p:bgPr>
+        <a:solidFill>
+          <a:schemeClr val="bg1"/>
+        </a:solidFill>
+        <a:effectLst/>
+      </p:bgPr>
+    </p:bg>
+    <p:spTree>
+      <p:nvGrpSpPr>
+        <p:cNvPr id="1" name=""/>
+        <p:cNvGrpSpPr/>
+        <p:nvPr/>
+      </p:nvGrpSpPr>
+      <p:grpSpPr>
+        <a:xfrm>
+          <a:off x="0" y="0"/>
+          <a:ext cx="0" cy="0"/>
+          <a:chOff x="0" y="0"/>
+          <a:chExt cx="0" cy="0"/>
+        </a:xfrm>
+      </p:grpSpPr>
+      <p:sp useBgFill="1">
+        <p:nvSpPr>
+          <p:cNvPr id="21" name="Rectangle 20">
+            <a:extLst>
+              <a:ext uri="{FF2B5EF4-FFF2-40B4-BE49-F238E27FC236}">
+                <a16:creationId xmlns:a16="http://schemas.microsoft.com/office/drawing/2014/main" id="{D70BC64E-B094-49DE-BD9C-DB662FCF598F}"/>
+              </a:ext>
+              <a:ext uri="{C183D7F6-B498-43B3-948B-1728B52AA6E4}">
+                <adec:decorative xmlns:adec="http://schemas.microsoft.com/office/drawing/2017/decorative" val="1"/>
+              </a:ext>
+            </a:extLst>
+          </p:cNvPr>
+          <p:cNvSpPr>
+            <a:spLocks noGrp="1" noRot="1" noChangeAspect="1" noMove="1" noResize="1" noEditPoints="1" noAdjustHandles="1" noChangeArrowheads="1" noChangeShapeType="1" noTextEdit="1"/>
+          </p:cNvSpPr>
+          <p:nvPr>
+            <p:extLst>
+              <p:ext uri="{386F3935-93C4-4BCD-93E2-E3B085C9AB24}">
+                <p16:designElem xmlns:p16="http://schemas.microsoft.com/office/powerpoint/2015/main" val="1"/>
+              </p:ext>
+            </p:extLst>
+          </p:nvPr>
+        </p:nvSpPr>
+        <p:spPr>
+          <a:xfrm>
+            <a:off x="0" y="0"/>
+            <a:ext cx="12192000" cy="6858000"/>
+          </a:xfrm>
+          <a:prstGeom prst="rect">
+            <a:avLst/>
+          </a:prstGeom>
+          <a:ln w="12700" cap="flat" cmpd="sng" algn="ctr">
+            <a:noFill/>
+            <a:prstDash val="solid"/>
+            <a:miter lim="800000"/>
+          </a:ln>
+          <a:effectLst/>
+          <a:extLst>
+            <a:ext uri="{91240B29-F687-4F45-9708-019B960494DF}">
+              <a14:hiddenLine xmlns:a14="http://schemas.microsoft.com/office/drawing/2010/main" w="12700" cap="flat" cmpd="sng" algn="ctr">
+                <a:solidFill>
+                  <a:schemeClr val="accent1">
+                    <a:shade val="50000"/>
+                  </a:schemeClr>
+                </a:solidFill>
+                <a:prstDash val="solid"/>
+                <a:miter lim="800000"/>
+              </a14:hiddenLine>
+            </a:ext>
+          </a:extLst>
+        </p:spPr>
+        <p:style>
+          <a:lnRef idx="2">
+            <a:schemeClr val="accent1">
+              <a:shade val="50000"/>
+            </a:schemeClr>
+          </a:lnRef>
+          <a:fillRef idx="1">
+            <a:schemeClr val="accent1"/>
+          </a:fillRef>
+          <a:effectRef idx="0">
+            <a:schemeClr val="accent1"/>
+          </a:effectRef>
+          <a:fontRef idx="minor">
+            <a:schemeClr val="lt1"/>
+          </a:fontRef>
+        </p:style>
+        <p:txBody>
+          <a:bodyPr rtlCol="0" anchor="ctr"/>
+          <a:lstStyle/>
+          <a:p>
+            <a:pPr algn="ctr"/>
+            <a:endParaRPr lang="en-US"/>
+          </a:p>
+        </p:txBody>
+      </p:sp>
+      <p:sp>
+        <p:nvSpPr>
+          <p:cNvPr id="2" name="Title 1">
+            <a:extLst>
+              <a:ext uri="{FF2B5EF4-FFF2-40B4-BE49-F238E27FC236}">
+                <a16:creationId xmlns:a16="http://schemas.microsoft.com/office/drawing/2014/main" id="{BC738E08-91ED-FBA6-25F9-4DD025C05AE5}"/>
+              </a:ext>
+            </a:extLst>
+          </p:cNvPr>
+          <p:cNvSpPr>
+            <a:spLocks noGrp="1"/>
+          </p:cNvSpPr>
+          <p:nvPr>
+            <p:ph type="title"/>
+          </p:nvPr>
+        </p:nvSpPr>
+        <p:spPr>
+          <a:xfrm>
+            <a:off x="6413912" y="687517"/>
+            <a:ext cx="4417522" cy="1181100"/>
+          </a:xfrm>
+        </p:spPr>
+        <p:txBody>
+          <a:bodyPr>
+            <a:normAutofit/>
+          </a:bodyPr>
+          <a:lstStyle/>
+          <a:p>
+            <a:r>
+              <a:rPr lang="en-US" dirty="0"/>
+              <a:t>Development</a:t>
+            </a:r>
+          </a:p>
+        </p:txBody>
+      </p:sp>
+      <p:sp>
+        <p:nvSpPr>
+          <p:cNvPr id="23" name="Rectangle 22">
+            <a:extLst>
+              <a:ext uri="{FF2B5EF4-FFF2-40B4-BE49-F238E27FC236}">
+                <a16:creationId xmlns:a16="http://schemas.microsoft.com/office/drawing/2014/main" id="{A718E0F5-1EF3-64D6-0802-B7983AC63269}"/>
+              </a:ext>
+              <a:ext uri="{C183D7F6-B498-43B3-948B-1728B52AA6E4}">
+                <adec:decorative xmlns:adec="http://schemas.microsoft.com/office/drawing/2017/decorative" val="1"/>
+              </a:ext>
+            </a:extLst>
+          </p:cNvPr>
+          <p:cNvSpPr>
+            <a:spLocks noGrp="1" noRot="1" noChangeAspect="1" noMove="1" noResize="1" noEditPoints="1" noAdjustHandles="1" noChangeArrowheads="1" noChangeShapeType="1" noTextEdit="1"/>
+          </p:cNvSpPr>
+          <p:nvPr>
+            <p:extLst>
+              <p:ext uri="{386F3935-93C4-4BCD-93E2-E3B085C9AB24}">
+                <p16:designElem xmlns:p16="http://schemas.microsoft.com/office/powerpoint/2015/main" val="1"/>
+              </p:ext>
+            </p:extLst>
+          </p:nvPr>
+        </p:nvSpPr>
+        <p:spPr>
+          <a:xfrm>
+            <a:off x="1" y="3737234"/>
+            <a:ext cx="12192000" cy="3120318"/>
+          </a:xfrm>
+          <a:prstGeom prst="rect">
+            <a:avLst/>
+          </a:prstGeom>
+          <a:gradFill>
+            <a:gsLst>
+              <a:gs pos="14000">
+                <a:schemeClr val="accent1">
+                  <a:lumMod val="60000"/>
+                  <a:lumOff val="40000"/>
+                  <a:alpha val="0"/>
+                </a:schemeClr>
+              </a:gs>
+              <a:gs pos="100000">
+                <a:schemeClr val="accent1">
+                  <a:lumMod val="60000"/>
+                  <a:lumOff val="40000"/>
+                </a:schemeClr>
+              </a:gs>
+            </a:gsLst>
+            <a:lin ang="5400000" scaled="1"/>
+          </a:gradFill>
+          <a:ln>
+            <a:noFill/>
+          </a:ln>
+        </p:spPr>
+        <p:style>
+          <a:lnRef idx="2">
+            <a:schemeClr val="accent1">
+              <a:shade val="50000"/>
+            </a:schemeClr>
+          </a:lnRef>
+          <a:fillRef idx="1">
+            <a:schemeClr val="accent1"/>
+          </a:fillRef>
+          <a:effectRef idx="0">
+            <a:schemeClr val="accent1"/>
+          </a:effectRef>
+          <a:fontRef idx="minor">
+            <a:schemeClr val="lt1"/>
+          </a:fontRef>
+        </p:style>
+        <p:txBody>
+          <a:bodyPr rtlCol="0" anchor="ctr"/>
+          <a:lstStyle/>
+          <a:p>
+            <a:pPr algn="ctr"/>
+            <a:endParaRPr lang="en-US"/>
+          </a:p>
+        </p:txBody>
+      </p:sp>
+      <p:sp>
+        <p:nvSpPr>
+          <p:cNvPr id="9" name="Content Placeholder 8">
+            <a:extLst>
+              <a:ext uri="{FF2B5EF4-FFF2-40B4-BE49-F238E27FC236}">
+                <a16:creationId xmlns:a16="http://schemas.microsoft.com/office/drawing/2014/main" id="{5E018B7D-5487-FF03-3FC4-0DFB7A57D655}"/>
+              </a:ext>
+            </a:extLst>
+          </p:cNvPr>
+          <p:cNvSpPr>
+            <a:spLocks noGrp="1"/>
+          </p:cNvSpPr>
+          <p:nvPr>
+            <p:ph idx="1"/>
+          </p:nvPr>
+        </p:nvSpPr>
+        <p:spPr>
+          <a:xfrm>
+            <a:off x="6413912" y="2158012"/>
+            <a:ext cx="4191000" cy="3890965"/>
+          </a:xfrm>
+        </p:spPr>
+        <p:txBody>
+          <a:bodyPr>
+            <a:normAutofit/>
+          </a:bodyPr>
+          <a:lstStyle/>
+          <a:p>
+            <a:r>
+              <a:rPr lang="en-US" dirty="0"/>
+              <a:t>Started working on AI</a:t>
+            </a:r>
+          </a:p>
+          <a:p>
+            <a:r>
+              <a:rPr lang="en-US" dirty="0"/>
+              <a:t>Implemented assets/packages that will help with development</a:t>
+            </a:r>
+          </a:p>
+        </p:txBody>
+      </p:sp>
+      <p:pic>
+        <p:nvPicPr>
+          <p:cNvPr id="5" name="Content Placeholder 4">
+            <a:extLst>
+              <a:ext uri="{FF2B5EF4-FFF2-40B4-BE49-F238E27FC236}">
+                <a16:creationId xmlns:a16="http://schemas.microsoft.com/office/drawing/2014/main" id="{02969C9C-001D-434F-4CCE-7EE5A9CDF169}"/>
+              </a:ext>
+            </a:extLst>
+          </p:cNvPr>
+          <p:cNvPicPr>
+            <a:picLocks noChangeAspect="1"/>
+          </p:cNvPicPr>
+          <p:nvPr/>
+        </p:nvPicPr>
+        <p:blipFill rotWithShape="1">
+          <a:blip r:embed="rId2"/>
+          <a:srcRect l="24718" r="20616"/>
+          <a:stretch/>
+        </p:blipFill>
+        <p:spPr>
+          <a:xfrm>
+            <a:off x="402998" y="1278067"/>
+            <a:ext cx="4082783" cy="4593188"/>
+          </a:xfrm>
+          <a:prstGeom prst="rect">
+            <a:avLst/>
+          </a:prstGeom>
+        </p:spPr>
+      </p:pic>
+    </p:spTree>
+    <p:extLst>
+      <p:ext uri="{BB962C8B-B14F-4D97-AF65-F5344CB8AC3E}">
+        <p14:creationId xmlns:p14="http://schemas.microsoft.com/office/powerpoint/2010/main" val="2739513423"/>
+      </p:ext>
+    </p:extLst>
+  </p:cSld>
+  <p:clrMapOvr>
+    <a:masterClrMapping/>
+  </p:clrMapOvr>
+</p:sld>
+</file>
+
+<file path=ppt/slides/slide8.xml><?xml version="1.0" encoding="utf-8"?>
+<p:sld xmlns:a="http://schemas.openxmlformats.org/drawingml/2006/main" xmlns:r="http://schemas.openxmlformats.org/officeDocument/2006/relationships" xmlns:p="http://schemas.openxmlformats.org/presentationml/2006/main">
+  <p:cSld>
+    <p:bg>
+      <p:bgPr>
+        <a:solidFill>
+          <a:schemeClr val="bg1"/>
+        </a:solidFill>
+        <a:effectLst/>
+      </p:bgPr>
+    </p:bg>
+    <p:spTree>
+      <p:nvGrpSpPr>
+        <p:cNvPr id="1" name=""/>
+        <p:cNvGrpSpPr/>
+        <p:nvPr/>
+      </p:nvGrpSpPr>
+      <p:grpSpPr>
+        <a:xfrm>
+          <a:off x="0" y="0"/>
+          <a:ext cx="0" cy="0"/>
+          <a:chOff x="0" y="0"/>
+          <a:chExt cx="0" cy="0"/>
+        </a:xfrm>
+      </p:grpSpPr>
       <p:sp>
         <p:nvSpPr>
           <p:cNvPr id="16" name="Rectangle 8">
@@ -5587,7 +6443,7 @@
 </p:sld>
 </file>
 
-<file path=ppt/slides/slide7.xml><?xml version="1.0" encoding="utf-8"?>
+<file path=ppt/slides/slide9.xml><?xml version="1.0" encoding="utf-8"?>
 <p:sld xmlns:a="http://schemas.openxmlformats.org/drawingml/2006/main" xmlns:r="http://schemas.openxmlformats.org/officeDocument/2006/relationships" xmlns:p="http://schemas.openxmlformats.org/presentationml/2006/main">
   <p:cSld>
     <p:bg>

</xml_diff>

<commit_message>
added pitch for meeting
</commit_message>
<xml_diff>
--- a/Documents/Pitch.pptx
+++ b/Documents/Pitch.pptx
@@ -7,11 +7,11 @@
   <p:sldIdLst>
     <p:sldId id="256" r:id="rId2"/>
     <p:sldId id="263" r:id="rId3"/>
-    <p:sldId id="257" r:id="rId4"/>
-    <p:sldId id="258" r:id="rId5"/>
-    <p:sldId id="264" r:id="rId6"/>
+    <p:sldId id="265" r:id="rId4"/>
+    <p:sldId id="264" r:id="rId5"/>
+    <p:sldId id="267" r:id="rId6"/>
     <p:sldId id="259" r:id="rId7"/>
-    <p:sldId id="260" r:id="rId8"/>
+    <p:sldId id="266" r:id="rId8"/>
     <p:sldId id="261" r:id="rId9"/>
     <p:sldId id="262" r:id="rId10"/>
   </p:sldIdLst>
@@ -271,7 +271,7 @@
           <a:p>
             <a:fld id="{9D0D92BC-42A9-434B-8530-ADBF4485E407}" type="datetimeFigureOut">
               <a:rPr lang="en-US" smtClean="0"/>
-              <a:t>3/8/2023</a:t>
+              <a:t>4/11/2023</a:t>
             </a:fld>
             <a:endParaRPr lang="en-US"/>
           </a:p>
@@ -522,7 +522,7 @@
           <a:p>
             <a:fld id="{9D0D92BC-42A9-434B-8530-ADBF4485E407}" type="datetimeFigureOut">
               <a:rPr lang="en-US" smtClean="0"/>
-              <a:t>3/8/2023</a:t>
+              <a:t>4/11/2023</a:t>
             </a:fld>
             <a:endParaRPr lang="en-US"/>
           </a:p>
@@ -730,7 +730,7 @@
           <a:p>
             <a:fld id="{9D0D92BC-42A9-434B-8530-ADBF4485E407}" type="datetimeFigureOut">
               <a:rPr lang="en-US" smtClean="0"/>
-              <a:t>3/8/2023</a:t>
+              <a:t>4/11/2023</a:t>
             </a:fld>
             <a:endParaRPr lang="en-US"/>
           </a:p>
@@ -928,7 +928,7 @@
           <a:p>
             <a:fld id="{9D0D92BC-42A9-434B-8530-ADBF4485E407}" type="datetimeFigureOut">
               <a:rPr lang="en-US" smtClean="0"/>
-              <a:t>3/8/2023</a:t>
+              <a:t>4/11/2023</a:t>
             </a:fld>
             <a:endParaRPr lang="en-US"/>
           </a:p>
@@ -1208,7 +1208,7 @@
           <a:p>
             <a:fld id="{9D0D92BC-42A9-434B-8530-ADBF4485E407}" type="datetimeFigureOut">
               <a:rPr lang="en-US" smtClean="0"/>
-              <a:t>3/8/2023</a:t>
+              <a:t>4/11/2023</a:t>
             </a:fld>
             <a:endParaRPr lang="en-US"/>
           </a:p>
@@ -1516,7 +1516,7 @@
           <a:p>
             <a:fld id="{9D0D92BC-42A9-434B-8530-ADBF4485E407}" type="datetimeFigureOut">
               <a:rPr lang="en-US" smtClean="0"/>
-              <a:t>3/8/2023</a:t>
+              <a:t>4/11/2023</a:t>
             </a:fld>
             <a:endParaRPr lang="en-US"/>
           </a:p>
@@ -1936,7 +1936,7 @@
           <a:p>
             <a:fld id="{9D0D92BC-42A9-434B-8530-ADBF4485E407}" type="datetimeFigureOut">
               <a:rPr lang="en-US" smtClean="0"/>
-              <a:t>3/8/2023</a:t>
+              <a:t>4/11/2023</a:t>
             </a:fld>
             <a:endParaRPr lang="en-US"/>
           </a:p>
@@ -2168,7 +2168,7 @@
           <a:p>
             <a:fld id="{9D0D92BC-42A9-434B-8530-ADBF4485E407}" type="datetimeFigureOut">
               <a:rPr lang="en-US" smtClean="0"/>
-              <a:t>3/8/2023</a:t>
+              <a:t>4/11/2023</a:t>
             </a:fld>
             <a:endParaRPr lang="en-US"/>
           </a:p>
@@ -2281,7 +2281,7 @@
           <a:p>
             <a:fld id="{9D0D92BC-42A9-434B-8530-ADBF4485E407}" type="datetimeFigureOut">
               <a:rPr lang="en-US" smtClean="0"/>
-              <a:t>3/8/2023</a:t>
+              <a:t>4/11/2023</a:t>
             </a:fld>
             <a:endParaRPr lang="en-US"/>
           </a:p>
@@ -2598,7 +2598,7 @@
           <a:p>
             <a:fld id="{9D0D92BC-42A9-434B-8530-ADBF4485E407}" type="datetimeFigureOut">
               <a:rPr lang="en-US" smtClean="0"/>
-              <a:t>3/8/2023</a:t>
+              <a:t>4/11/2023</a:t>
             </a:fld>
             <a:endParaRPr lang="en-US"/>
           </a:p>
@@ -2890,7 +2890,7 @@
           <a:p>
             <a:fld id="{9D0D92BC-42A9-434B-8530-ADBF4485E407}" type="datetimeFigureOut">
               <a:rPr lang="en-US" smtClean="0"/>
-              <a:t>3/8/2023</a:t>
+              <a:t>4/11/2023</a:t>
             </a:fld>
             <a:endParaRPr lang="en-US"/>
           </a:p>
@@ -3197,7 +3197,7 @@
             <a:fld id="{9D0D92BC-42A9-434B-8530-ADBF4485E407}" type="datetimeFigureOut">
               <a:rPr lang="en-US" smtClean="0"/>
               <a:pPr/>
-              <a:t>3/8/2023</a:t>
+              <a:t>4/11/2023</a:t>
             </a:fld>
             <a:endParaRPr lang="en-US" dirty="0"/>
           </a:p>
@@ -3841,8 +3841,8 @@
           <a:lstStyle/>
           <a:p>
             <a:r>
-              <a:rPr lang="en-US"/>
-              <a:t>Caretaker Simulator</a:t>
+              <a:rPr lang="en-US" dirty="0" err="1"/>
+              <a:t>Caretech</a:t>
             </a:r>
             <a:endParaRPr lang="en-US" dirty="0"/>
           </a:p>
@@ -4362,10 +4362,10 @@
       </p:grpSpPr>
       <p:sp useBgFill="1">
         <p:nvSpPr>
-          <p:cNvPr id="10" name="Rectangle 9">
-            <a:extLst>
-              <a:ext uri="{FF2B5EF4-FFF2-40B4-BE49-F238E27FC236}">
-                <a16:creationId xmlns:a16="http://schemas.microsoft.com/office/drawing/2014/main" id="{D70BC64E-B094-49DE-BD9C-DB662FCF598F}"/>
+          <p:cNvPr id="2057" name="Rectangle 2056">
+            <a:extLst>
+              <a:ext uri="{FF2B5EF4-FFF2-40B4-BE49-F238E27FC236}">
+                <a16:creationId xmlns:a16="http://schemas.microsoft.com/office/drawing/2014/main" id="{3DAD064D-86F0-42ED-B520-99689857918E}"/>
               </a:ext>
               <a:ext uri="{C183D7F6-B498-43B3-948B-1728B52AA6E4}">
                 <adec:decorative xmlns:adec="http://schemas.microsoft.com/office/drawing/2017/decorative" val="1"/>
@@ -4441,7 +4441,7 @@
           <p:cNvPr id="2" name="Title 1">
             <a:extLst>
               <a:ext uri="{FF2B5EF4-FFF2-40B4-BE49-F238E27FC236}">
-                <a16:creationId xmlns:a16="http://schemas.microsoft.com/office/drawing/2014/main" id="{3D1A1391-78CF-F967-6838-FDEBD8EDAC5A}"/>
+                <a16:creationId xmlns:a16="http://schemas.microsoft.com/office/drawing/2014/main" id="{B289BF4D-EC56-4D60-358A-19194F4C5121}"/>
               </a:ext>
             </a:extLst>
           </p:cNvPr>
@@ -4454,8 +4454,8 @@
         </p:nvSpPr>
         <p:spPr>
           <a:xfrm>
-            <a:off x="952500" y="723900"/>
-            <a:ext cx="4417522" cy="1181100"/>
+            <a:off x="7048500" y="762001"/>
+            <a:ext cx="4210050" cy="1141004"/>
           </a:xfrm>
         </p:spPr>
         <p:txBody>
@@ -4466,17 +4466,17 @@
           <a:p>
             <a:r>
               <a:rPr lang="en-US" dirty="0"/>
-              <a:t>Project plan</a:t>
-            </a:r>
-          </a:p>
-        </p:txBody>
-      </p:sp>
-      <p:sp>
-        <p:nvSpPr>
-          <p:cNvPr id="12" name="Rectangle 11">
-            <a:extLst>
-              <a:ext uri="{FF2B5EF4-FFF2-40B4-BE49-F238E27FC236}">
-                <a16:creationId xmlns:a16="http://schemas.microsoft.com/office/drawing/2014/main" id="{A718E0F5-1EF3-64D6-0802-B7983AC63269}"/>
+              <a:t>Identity of the game</a:t>
+            </a:r>
+          </a:p>
+        </p:txBody>
+      </p:sp>
+      <p:sp>
+        <p:nvSpPr>
+          <p:cNvPr id="2059" name="Rectangle 2058">
+            <a:extLst>
+              <a:ext uri="{FF2B5EF4-FFF2-40B4-BE49-F238E27FC236}">
+                <a16:creationId xmlns:a16="http://schemas.microsoft.com/office/drawing/2014/main" id="{719ED580-63C5-A19A-548E-20B2B752814F}"/>
               </a:ext>
               <a:ext uri="{C183D7F6-B498-43B3-948B-1728B52AA6E4}">
                 <adec:decorative xmlns:adec="http://schemas.microsoft.com/office/drawing/2017/decorative" val="1"/>
@@ -4496,30 +4496,15 @@
         </p:nvSpPr>
         <p:spPr>
           <a:xfrm>
-            <a:off x="1" y="3737234"/>
-            <a:ext cx="12192000" cy="3120318"/>
+            <a:off x="9099" y="0"/>
+            <a:ext cx="6096000" cy="6858000"/>
           </a:xfrm>
           <a:prstGeom prst="rect">
             <a:avLst/>
           </a:prstGeom>
-          <a:gradFill>
-            <a:gsLst>
-              <a:gs pos="14000">
-                <a:schemeClr val="accent1">
-                  <a:lumMod val="60000"/>
-                  <a:lumOff val="40000"/>
-                  <a:alpha val="0"/>
-                </a:schemeClr>
-              </a:gs>
-              <a:gs pos="100000">
-                <a:schemeClr val="accent1">
-                  <a:lumMod val="60000"/>
-                  <a:lumOff val="40000"/>
-                </a:schemeClr>
-              </a:gs>
-            </a:gsLst>
-            <a:lin ang="5400000" scaled="1"/>
-          </a:gradFill>
+          <a:solidFill>
+            <a:schemeClr val="bg1"/>
+          </a:solidFill>
           <a:ln>
             <a:noFill/>
           </a:ln>
@@ -4549,12 +4534,167 @@
           </a:p>
         </p:txBody>
       </p:sp>
+      <p:pic>
+        <p:nvPicPr>
+          <p:cNvPr id="2052" name="Picture 4" descr="Game Console Images - Free Download on Freepik">
+            <a:extLst>
+              <a:ext uri="{FF2B5EF4-FFF2-40B4-BE49-F238E27FC236}">
+                <a16:creationId xmlns:a16="http://schemas.microsoft.com/office/drawing/2014/main" id="{B41B46DD-555A-DEB6-A4E0-92042D3E115B}"/>
+              </a:ext>
+            </a:extLst>
+          </p:cNvPr>
+          <p:cNvPicPr>
+            <a:picLocks noChangeAspect="1" noChangeArrowheads="1"/>
+          </p:cNvPicPr>
+          <p:nvPr/>
+        </p:nvPicPr>
+        <p:blipFill rotWithShape="1">
+          <a:blip r:embed="rId2">
+            <a:extLst>
+              <a:ext uri="{28A0092B-C50C-407E-A947-70E740481C1C}">
+                <a14:useLocalDpi xmlns:a14="http://schemas.microsoft.com/office/drawing/2010/main" val="0"/>
+              </a:ext>
+            </a:extLst>
+          </a:blip>
+          <a:srcRect r="-3" b="-3"/>
+          <a:stretch/>
+        </p:blipFill>
+        <p:spPr bwMode="auto">
+          <a:xfrm>
+            <a:off x="869342" y="1250342"/>
+            <a:ext cx="4357316" cy="4357316"/>
+          </a:xfrm>
+          <a:custGeom>
+            <a:avLst/>
+            <a:gdLst/>
+            <a:ahLst/>
+            <a:cxnLst/>
+            <a:rect l="l" t="t" r="r" b="b"/>
+            <a:pathLst>
+              <a:path w="4357316" h="4357316">
+                <a:moveTo>
+                  <a:pt x="2178658" y="0"/>
+                </a:moveTo>
+                <a:cubicBezTo>
+                  <a:pt x="3381898" y="0"/>
+                  <a:pt x="4357316" y="975418"/>
+                  <a:pt x="4357316" y="2178658"/>
+                </a:cubicBezTo>
+                <a:cubicBezTo>
+                  <a:pt x="4357316" y="3381898"/>
+                  <a:pt x="3381898" y="4357316"/>
+                  <a:pt x="2178658" y="4357316"/>
+                </a:cubicBezTo>
+                <a:cubicBezTo>
+                  <a:pt x="975418" y="4357316"/>
+                  <a:pt x="0" y="3381898"/>
+                  <a:pt x="0" y="2178658"/>
+                </a:cubicBezTo>
+                <a:cubicBezTo>
+                  <a:pt x="0" y="975418"/>
+                  <a:pt x="975418" y="0"/>
+                  <a:pt x="2178658" y="0"/>
+                </a:cubicBezTo>
+                <a:close/>
+              </a:path>
+            </a:pathLst>
+          </a:custGeom>
+          <a:noFill/>
+          <a:extLst>
+            <a:ext uri="{909E8E84-426E-40DD-AFC4-6F175D3DCCD1}">
+              <a14:hiddenFill xmlns:a14="http://schemas.microsoft.com/office/drawing/2010/main">
+                <a:solidFill>
+                  <a:srgbClr val="FFFFFF"/>
+                </a:solidFill>
+              </a14:hiddenFill>
+            </a:ext>
+          </a:extLst>
+        </p:spPr>
+      </p:pic>
+      <p:sp>
+        <p:nvSpPr>
+          <p:cNvPr id="2061" name="Rectangle 2060">
+            <a:extLst>
+              <a:ext uri="{FF2B5EF4-FFF2-40B4-BE49-F238E27FC236}">
+                <a16:creationId xmlns:a16="http://schemas.microsoft.com/office/drawing/2014/main" id="{8871645A-E574-F970-F079-09F7B7C48DBC}"/>
+              </a:ext>
+              <a:ext uri="{C183D7F6-B498-43B3-948B-1728B52AA6E4}">
+                <adec:decorative xmlns:adec="http://schemas.microsoft.com/office/drawing/2017/decorative" val="1"/>
+              </a:ext>
+            </a:extLst>
+          </p:cNvPr>
+          <p:cNvSpPr>
+            <a:spLocks noGrp="1" noRot="1" noChangeAspect="1" noMove="1" noResize="1" noEditPoints="1" noAdjustHandles="1" noChangeArrowheads="1" noChangeShapeType="1" noTextEdit="1"/>
+          </p:cNvSpPr>
+          <p:nvPr>
+            <p:extLst>
+              <p:ext uri="{386F3935-93C4-4BCD-93E2-E3B085C9AB24}">
+                <p16:designElem xmlns:p16="http://schemas.microsoft.com/office/powerpoint/2015/main" val="1"/>
+              </p:ext>
+            </p:extLst>
+          </p:nvPr>
+        </p:nvSpPr>
+        <p:spPr>
+          <a:xfrm>
+            <a:off x="6088796" y="2521332"/>
+            <a:ext cx="6110048" cy="4339757"/>
+          </a:xfrm>
+          <a:prstGeom prst="rect">
+            <a:avLst/>
+          </a:prstGeom>
+          <a:gradFill>
+            <a:gsLst>
+              <a:gs pos="14000">
+                <a:schemeClr val="accent1">
+                  <a:lumMod val="60000"/>
+                  <a:lumOff val="40000"/>
+                  <a:alpha val="0"/>
+                </a:schemeClr>
+              </a:gs>
+              <a:gs pos="92000">
+                <a:schemeClr val="accent1">
+                  <a:lumMod val="60000"/>
+                  <a:lumOff val="40000"/>
+                </a:schemeClr>
+              </a:gs>
+            </a:gsLst>
+            <a:lin ang="5400000" scaled="1"/>
+          </a:gradFill>
+          <a:ln>
+            <a:noFill/>
+          </a:ln>
+        </p:spPr>
+        <p:style>
+          <a:lnRef idx="2">
+            <a:schemeClr val="accent1">
+              <a:shade val="50000"/>
+            </a:schemeClr>
+          </a:lnRef>
+          <a:fillRef idx="1">
+            <a:schemeClr val="accent1"/>
+          </a:fillRef>
+          <a:effectRef idx="0">
+            <a:schemeClr val="accent1"/>
+          </a:effectRef>
+          <a:fontRef idx="minor">
+            <a:schemeClr val="lt1"/>
+          </a:fontRef>
+        </p:style>
+        <p:txBody>
+          <a:bodyPr rtlCol="0" anchor="ctr"/>
+          <a:lstStyle/>
+          <a:p>
+            <a:pPr algn="ctr"/>
+            <a:endParaRPr lang="en-US"/>
+          </a:p>
+        </p:txBody>
+      </p:sp>
       <p:sp>
         <p:nvSpPr>
           <p:cNvPr id="3" name="Content Placeholder 2">
             <a:extLst>
               <a:ext uri="{FF2B5EF4-FFF2-40B4-BE49-F238E27FC236}">
-                <a16:creationId xmlns:a16="http://schemas.microsoft.com/office/drawing/2014/main" id="{BA92B87A-E17C-60DC-471C-F580BD0156B6}"/>
+                <a16:creationId xmlns:a16="http://schemas.microsoft.com/office/drawing/2014/main" id="{C1A7B590-B8F4-501E-7324-9D2179BF9B89}"/>
               </a:ext>
             </a:extLst>
           </p:cNvPr>
@@ -4567,8 +4707,8 @@
         </p:nvSpPr>
         <p:spPr>
           <a:xfrm>
-            <a:off x="952500" y="2285997"/>
-            <a:ext cx="4191000" cy="3890965"/>
+            <a:off x="7048500" y="2286000"/>
+            <a:ext cx="4200099" cy="3810000"/>
           </a:xfrm>
         </p:spPr>
         <p:txBody>
@@ -4579,13 +4719,31 @@
           <a:p>
             <a:r>
               <a:rPr lang="en-US" dirty="0"/>
-              <a:t>Very good feedback.</a:t>
-            </a:r>
-          </a:p>
-          <a:p>
-            <a:r>
-              <a:rPr lang="en-US" dirty="0"/>
-              <a:t>Very close to completion.</a:t>
+              <a:t>Type of game         : Educational</a:t>
+            </a:r>
+          </a:p>
+          <a:p>
+            <a:r>
+              <a:rPr lang="en-US" dirty="0"/>
+              <a:t>Genre                       : Social Simulation</a:t>
+            </a:r>
+          </a:p>
+          <a:p>
+            <a:r>
+              <a:rPr lang="en-US" dirty="0"/>
+              <a:t>Target audience    : Students of Health and Wellbeing</a:t>
+            </a:r>
+          </a:p>
+          <a:p>
+            <a:r>
+              <a:rPr lang="en-US" dirty="0"/>
+              <a:t>Platform                   : Desktop</a:t>
+            </a:r>
+          </a:p>
+          <a:p>
+            <a:r>
+              <a:rPr lang="en-US" dirty="0"/>
+              <a:t>Engine                      : Unity</a:t>
             </a:r>
           </a:p>
           <a:p>
@@ -4593,40 +4751,10 @@
           </a:p>
         </p:txBody>
       </p:sp>
-      <p:pic>
-        <p:nvPicPr>
-          <p:cNvPr id="5" name="Picture 4">
-            <a:extLst>
-              <a:ext uri="{FF2B5EF4-FFF2-40B4-BE49-F238E27FC236}">
-                <a16:creationId xmlns:a16="http://schemas.microsoft.com/office/drawing/2014/main" id="{C5CF7A84-431D-AB37-BF5F-AE206F3EECE4}"/>
-              </a:ext>
-            </a:extLst>
-          </p:cNvPr>
-          <p:cNvPicPr>
-            <a:picLocks noChangeAspect="1"/>
-          </p:cNvPicPr>
-          <p:nvPr/>
-        </p:nvPicPr>
-        <p:blipFill>
-          <a:blip r:embed="rId2"/>
-          <a:stretch>
-            <a:fillRect/>
-          </a:stretch>
-        </p:blipFill>
-        <p:spPr>
-          <a:xfrm>
-            <a:off x="6322521" y="1769246"/>
-            <a:ext cx="4708521" cy="3319507"/>
-          </a:xfrm>
-          <a:prstGeom prst="rect">
-            <a:avLst/>
-          </a:prstGeom>
-        </p:spPr>
-      </p:pic>
     </p:spTree>
     <p:extLst>
       <p:ext uri="{BB962C8B-B14F-4D97-AF65-F5344CB8AC3E}">
-        <p14:creationId xmlns:p14="http://schemas.microsoft.com/office/powerpoint/2010/main" val="4078057596"/>
+        <p14:creationId xmlns:p14="http://schemas.microsoft.com/office/powerpoint/2010/main" val="3206387333"/>
       </p:ext>
     </p:extLst>
   </p:cSld>
@@ -4663,10 +4791,10 @@
       </p:grpSpPr>
       <p:sp useBgFill="1">
         <p:nvSpPr>
-          <p:cNvPr id="46" name="Rectangle 45">
-            <a:extLst>
-              <a:ext uri="{FF2B5EF4-FFF2-40B4-BE49-F238E27FC236}">
-                <a16:creationId xmlns:a16="http://schemas.microsoft.com/office/drawing/2014/main" id="{D70BC64E-B094-49DE-BD9C-DB662FCF598F}"/>
+          <p:cNvPr id="1031" name="Rectangle 1030">
+            <a:extLst>
+              <a:ext uri="{FF2B5EF4-FFF2-40B4-BE49-F238E27FC236}">
+                <a16:creationId xmlns:a16="http://schemas.microsoft.com/office/drawing/2014/main" id="{3DAD064D-86F0-42ED-B520-99689857918E}"/>
               </a:ext>
               <a:ext uri="{C183D7F6-B498-43B3-948B-1728B52AA6E4}">
                 <adec:decorative xmlns:adec="http://schemas.microsoft.com/office/drawing/2017/decorative" val="1"/>
@@ -4742,7 +4870,7 @@
           <p:cNvPr id="2" name="Title 1">
             <a:extLst>
               <a:ext uri="{FF2B5EF4-FFF2-40B4-BE49-F238E27FC236}">
-                <a16:creationId xmlns:a16="http://schemas.microsoft.com/office/drawing/2014/main" id="{FD54143B-0A98-AEA8-1881-37A5B4F5BD38}"/>
+                <a16:creationId xmlns:a16="http://schemas.microsoft.com/office/drawing/2014/main" id="{FEAC968D-A36D-8875-0E09-330D13A6C5ED}"/>
               </a:ext>
             </a:extLst>
           </p:cNvPr>
@@ -4755,29 +4883,29 @@
         </p:nvSpPr>
         <p:spPr>
           <a:xfrm>
-            <a:off x="6776349" y="541856"/>
-            <a:ext cx="4417522" cy="1181100"/>
-          </a:xfrm>
-        </p:spPr>
-        <p:txBody>
-          <a:bodyPr vert="horz" lIns="91440" tIns="45720" rIns="91440" bIns="45720" rtlCol="0">
+            <a:off x="952500" y="812042"/>
+            <a:ext cx="4264686" cy="1092958"/>
+          </a:xfrm>
+        </p:spPr>
+        <p:txBody>
+          <a:bodyPr>
             <a:normAutofit/>
           </a:bodyPr>
           <a:lstStyle/>
           <a:p>
             <a:r>
               <a:rPr lang="en-US" dirty="0"/>
-              <a:t>Portfolio</a:t>
-            </a:r>
-          </a:p>
-        </p:txBody>
-      </p:sp>
-      <p:sp>
-        <p:nvSpPr>
-          <p:cNvPr id="48" name="Rectangle 47">
-            <a:extLst>
-              <a:ext uri="{FF2B5EF4-FFF2-40B4-BE49-F238E27FC236}">
-                <a16:creationId xmlns:a16="http://schemas.microsoft.com/office/drawing/2014/main" id="{A718E0F5-1EF3-64D6-0802-B7983AC63269}"/>
+              <a:t>Gameplay</a:t>
+            </a:r>
+          </a:p>
+        </p:txBody>
+      </p:sp>
+      <p:sp>
+        <p:nvSpPr>
+          <p:cNvPr id="1033" name="Rectangle 1032">
+            <a:extLst>
+              <a:ext uri="{FF2B5EF4-FFF2-40B4-BE49-F238E27FC236}">
+                <a16:creationId xmlns:a16="http://schemas.microsoft.com/office/drawing/2014/main" id="{17A4D85E-F98A-F670-16C3-7B2B0DA3A0DA}"/>
               </a:ext>
               <a:ext uri="{C183D7F6-B498-43B3-948B-1728B52AA6E4}">
                 <adec:decorative xmlns:adec="http://schemas.microsoft.com/office/drawing/2017/decorative" val="1"/>
@@ -4797,8 +4925,8 @@
         </p:nvSpPr>
         <p:spPr>
           <a:xfrm>
-            <a:off x="1" y="3737234"/>
-            <a:ext cx="12192000" cy="3120318"/>
+            <a:off x="0" y="3217781"/>
+            <a:ext cx="6096000" cy="3640219"/>
           </a:xfrm>
           <a:prstGeom prst="rect">
             <a:avLst/>
@@ -4846,16 +4974,16 @@
           <a:lstStyle/>
           <a:p>
             <a:pPr algn="ctr"/>
-            <a:endParaRPr lang="en-US"/>
-          </a:p>
-        </p:txBody>
-      </p:sp>
-      <p:sp>
-        <p:nvSpPr>
-          <p:cNvPr id="7" name="Content Placeholder 6">
-            <a:extLst>
-              <a:ext uri="{FF2B5EF4-FFF2-40B4-BE49-F238E27FC236}">
-                <a16:creationId xmlns:a16="http://schemas.microsoft.com/office/drawing/2014/main" id="{7A2F2C72-ED71-6DBC-4FD3-6F44601588A2}"/>
+            <a:endParaRPr lang="en-US" dirty="0"/>
+          </a:p>
+        </p:txBody>
+      </p:sp>
+      <p:sp>
+        <p:nvSpPr>
+          <p:cNvPr id="3" name="Content Placeholder 2">
+            <a:extLst>
+              <a:ext uri="{FF2B5EF4-FFF2-40B4-BE49-F238E27FC236}">
+                <a16:creationId xmlns:a16="http://schemas.microsoft.com/office/drawing/2014/main" id="{105DA916-2610-F894-9C2F-FF8C307E68E6}"/>
               </a:ext>
             </a:extLst>
           </p:cNvPr>
@@ -4868,7 +4996,7 @@
         </p:nvSpPr>
         <p:spPr>
           <a:xfrm>
-            <a:off x="6606668" y="2264812"/>
+            <a:off x="952500" y="2285997"/>
             <a:ext cx="4191000" cy="3890965"/>
           </a:xfrm>
         </p:spPr>
@@ -4880,63 +5008,75 @@
           <a:p>
             <a:r>
               <a:rPr lang="en-US" dirty="0"/>
-              <a:t>Reading guide complete.</a:t>
-            </a:r>
-          </a:p>
-          <a:p>
-            <a:r>
-              <a:rPr lang="en-US" dirty="0"/>
-              <a:t>Good feedback on organization.</a:t>
-            </a:r>
-          </a:p>
-          <a:p>
-            <a:r>
-              <a:rPr lang="en-US" dirty="0"/>
-              <a:t>Started working on first sub-question :”What makes a game educational?”.</a:t>
-            </a:r>
-          </a:p>
-          <a:p>
-            <a:pPr marL="0" indent="0">
-              <a:buNone/>
-            </a:pPr>
+              <a:t>The player is going to take care of non-player characters in a retirement home semi-realistic simulation.</a:t>
+            </a:r>
+          </a:p>
+          <a:p>
+            <a:r>
+              <a:rPr lang="en-US" dirty="0"/>
+              <a:t>The player will need to react to their needs and use caretaker technologies in order to help them.</a:t>
+            </a:r>
+          </a:p>
+          <a:p>
+            <a:r>
+              <a:rPr lang="en-US" dirty="0"/>
+              <a:t>The goal of the game is to keep the non-player characters happy over the duration of the game.</a:t>
+            </a:r>
+          </a:p>
+          <a:p>
             <a:endParaRPr lang="en-US" dirty="0"/>
           </a:p>
         </p:txBody>
       </p:sp>
       <p:pic>
         <p:nvPicPr>
-          <p:cNvPr id="13" name="Picture 12">
-            <a:extLst>
-              <a:ext uri="{FF2B5EF4-FFF2-40B4-BE49-F238E27FC236}">
-                <a16:creationId xmlns:a16="http://schemas.microsoft.com/office/drawing/2014/main" id="{5B91367D-33FE-520F-8C58-1985D6C3D7A2}"/>
+          <p:cNvPr id="1026" name="Picture 2" descr="Caretaker Vector Illustration 168636 Vector Art at Vecteezy">
+            <a:extLst>
+              <a:ext uri="{FF2B5EF4-FFF2-40B4-BE49-F238E27FC236}">
+                <a16:creationId xmlns:a16="http://schemas.microsoft.com/office/drawing/2014/main" id="{E5ED59A5-C9EF-93A2-738F-6DB559D55B8B}"/>
               </a:ext>
             </a:extLst>
           </p:cNvPr>
           <p:cNvPicPr>
-            <a:picLocks noChangeAspect="1"/>
+            <a:picLocks noChangeAspect="1" noChangeArrowheads="1"/>
           </p:cNvPicPr>
           <p:nvPr/>
         </p:nvPicPr>
-        <p:blipFill>
-          <a:blip r:embed="rId2"/>
-          <a:stretch>
-            <a:fillRect/>
-          </a:stretch>
+        <p:blipFill rotWithShape="1">
+          <a:blip r:embed="rId2">
+            <a:extLst>
+              <a:ext uri="{28A0092B-C50C-407E-A947-70E740481C1C}">
+                <a14:useLocalDpi xmlns:a14="http://schemas.microsoft.com/office/drawing/2010/main" val="0"/>
+              </a:ext>
+            </a:extLst>
+          </a:blip>
+          <a:srcRect l="22104" r="15674" b="1"/>
+          <a:stretch/>
         </p:blipFill>
-        <p:spPr>
-          <a:xfrm>
-            <a:off x="683460" y="1132406"/>
-            <a:ext cx="3800862" cy="4593188"/>
+        <p:spPr bwMode="auto">
+          <a:xfrm>
+            <a:off x="6096000" y="10"/>
+            <a:ext cx="6095999" cy="6857990"/>
           </a:xfrm>
           <a:prstGeom prst="rect">
             <a:avLst/>
           </a:prstGeom>
+          <a:noFill/>
+          <a:extLst>
+            <a:ext uri="{909E8E84-426E-40DD-AFC4-6F175D3DCCD1}">
+              <a14:hiddenFill xmlns:a14="http://schemas.microsoft.com/office/drawing/2010/main">
+                <a:solidFill>
+                  <a:srgbClr val="FFFFFF"/>
+                </a:solidFill>
+              </a14:hiddenFill>
+            </a:ext>
+          </a:extLst>
         </p:spPr>
       </p:pic>
     </p:spTree>
     <p:extLst>
       <p:ext uri="{BB962C8B-B14F-4D97-AF65-F5344CB8AC3E}">
-        <p14:creationId xmlns:p14="http://schemas.microsoft.com/office/powerpoint/2010/main" val="3448015517"/>
+        <p14:creationId xmlns:p14="http://schemas.microsoft.com/office/powerpoint/2010/main" val="2732439704"/>
       </p:ext>
     </p:extLst>
   </p:cSld>
@@ -4973,10 +5113,10 @@
       </p:grpSpPr>
       <p:sp useBgFill="1">
         <p:nvSpPr>
-          <p:cNvPr id="3098" name="Rectangle 3082">
-            <a:extLst>
-              <a:ext uri="{FF2B5EF4-FFF2-40B4-BE49-F238E27FC236}">
-                <a16:creationId xmlns:a16="http://schemas.microsoft.com/office/drawing/2014/main" id="{D70BC64E-B094-49DE-BD9C-DB662FCF598F}"/>
+          <p:cNvPr id="5127" name="Rectangle 5126">
+            <a:extLst>
+              <a:ext uri="{FF2B5EF4-FFF2-40B4-BE49-F238E27FC236}">
+                <a16:creationId xmlns:a16="http://schemas.microsoft.com/office/drawing/2014/main" id="{3DAD064D-86F0-42ED-B520-99689857918E}"/>
               </a:ext>
               <a:ext uri="{C183D7F6-B498-43B3-948B-1728B52AA6E4}">
                 <adec:decorative xmlns:adec="http://schemas.microsoft.com/office/drawing/2017/decorative" val="1"/>
@@ -5052,7 +5192,7 @@
           <p:cNvPr id="2" name="Title 1">
             <a:extLst>
               <a:ext uri="{FF2B5EF4-FFF2-40B4-BE49-F238E27FC236}">
-                <a16:creationId xmlns:a16="http://schemas.microsoft.com/office/drawing/2014/main" id="{BC08A860-6E51-C699-247A-5F52D82DBCB9}"/>
+                <a16:creationId xmlns:a16="http://schemas.microsoft.com/office/drawing/2014/main" id="{1267C7E4-A37F-393C-CFBE-DA325AAE0534}"/>
               </a:ext>
             </a:extLst>
           </p:cNvPr>
@@ -5065,8 +5205,8 @@
         </p:nvSpPr>
         <p:spPr>
           <a:xfrm>
-            <a:off x="952500" y="914400"/>
-            <a:ext cx="4731923" cy="990600"/>
+            <a:off x="952500" y="812042"/>
+            <a:ext cx="4264686" cy="1092958"/>
           </a:xfrm>
         </p:spPr>
         <p:txBody>
@@ -5076,18 +5216,19 @@
           <a:lstStyle/>
           <a:p>
             <a:r>
-              <a:rPr lang="en-US" dirty="0"/>
-              <a:t>Pipeline</a:t>
-            </a:r>
-          </a:p>
-        </p:txBody>
-      </p:sp>
-      <p:sp>
-        <p:nvSpPr>
-          <p:cNvPr id="3099" name="Rectangle 3084">
-            <a:extLst>
-              <a:ext uri="{FF2B5EF4-FFF2-40B4-BE49-F238E27FC236}">
-                <a16:creationId xmlns:a16="http://schemas.microsoft.com/office/drawing/2014/main" id="{A718E0F5-1EF3-64D6-0802-B7983AC63269}"/>
+              <a:rPr lang="en-US" dirty="0" err="1"/>
+              <a:t>eDUCATION</a:t>
+            </a:r>
+            <a:endParaRPr lang="en-US" dirty="0"/>
+          </a:p>
+        </p:txBody>
+      </p:sp>
+      <p:sp>
+        <p:nvSpPr>
+          <p:cNvPr id="5129" name="Rectangle 5128">
+            <a:extLst>
+              <a:ext uri="{FF2B5EF4-FFF2-40B4-BE49-F238E27FC236}">
+                <a16:creationId xmlns:a16="http://schemas.microsoft.com/office/drawing/2014/main" id="{17A4D85E-F98A-F670-16C3-7B2B0DA3A0DA}"/>
               </a:ext>
               <a:ext uri="{C183D7F6-B498-43B3-948B-1728B52AA6E4}">
                 <adec:decorative xmlns:adec="http://schemas.microsoft.com/office/drawing/2017/decorative" val="1"/>
@@ -5107,8 +5248,8 @@
         </p:nvSpPr>
         <p:spPr>
           <a:xfrm>
-            <a:off x="1" y="3737234"/>
-            <a:ext cx="12192000" cy="3120318"/>
+            <a:off x="0" y="3217781"/>
+            <a:ext cx="6096000" cy="3640219"/>
           </a:xfrm>
           <a:prstGeom prst="rect">
             <a:avLst/>
@@ -5156,7 +5297,7 @@
           <a:lstStyle/>
           <a:p>
             <a:pPr algn="ctr"/>
-            <a:endParaRPr lang="en-US"/>
+            <a:endParaRPr lang="en-US" dirty="0"/>
           </a:p>
         </p:txBody>
       </p:sp>
@@ -5165,7 +5306,7 @@
           <p:cNvPr id="3" name="Content Placeholder 2">
             <a:extLst>
               <a:ext uri="{FF2B5EF4-FFF2-40B4-BE49-F238E27FC236}">
-                <a16:creationId xmlns:a16="http://schemas.microsoft.com/office/drawing/2014/main" id="{A2479E17-7DAF-88EA-808F-C1195E3BF96C}"/>
+                <a16:creationId xmlns:a16="http://schemas.microsoft.com/office/drawing/2014/main" id="{DB4B2B41-83B4-2B30-6DBF-33D8E1CD29B9}"/>
               </a:ext>
             </a:extLst>
           </p:cNvPr>
@@ -5179,7 +5320,7 @@
         <p:spPr>
           <a:xfrm>
             <a:off x="952500" y="2285997"/>
-            <a:ext cx="4731923" cy="3890965"/>
+            <a:ext cx="4191000" cy="3890965"/>
           </a:xfrm>
         </p:spPr>
         <p:txBody>
@@ -5190,29 +5331,29 @@
           <a:p>
             <a:r>
               <a:rPr lang="en-US" dirty="0"/>
-              <a:t>GitHub set up and running (already using)</a:t>
-            </a:r>
-          </a:p>
-          <a:p>
-            <a:r>
-              <a:rPr lang="en-US" dirty="0"/>
-              <a:t>Trello set up in SCRUM style.</a:t>
-            </a:r>
-          </a:p>
-          <a:p>
-            <a:r>
-              <a:rPr lang="en-US" dirty="0"/>
-              <a:t>Sprint definition complete.</a:t>
+              <a:t>The player will learn about the technologies by using them in the game.</a:t>
+            </a:r>
+          </a:p>
+          <a:p>
+            <a:r>
+              <a:rPr lang="en-US" dirty="0"/>
+              <a:t>The player will learn when and how to use the technologies. </a:t>
+            </a:r>
+          </a:p>
+          <a:p>
+            <a:r>
+              <a:rPr lang="en-US" dirty="0"/>
+              <a:t>The player will train in how to react in certain specific situations.</a:t>
             </a:r>
           </a:p>
         </p:txBody>
       </p:sp>
       <p:pic>
         <p:nvPicPr>
-          <p:cNvPr id="3076" name="Picture 4" descr="Download Trello Logo in SVG Vector or PNG File Format - Logo ...">
-            <a:extLst>
-              <a:ext uri="{FF2B5EF4-FFF2-40B4-BE49-F238E27FC236}">
-                <a16:creationId xmlns:a16="http://schemas.microsoft.com/office/drawing/2014/main" id="{84D161D3-B029-98C7-2EB4-18A6BEA64A57}"/>
+          <p:cNvPr id="5122" name="Picture 2" descr="10 Benefits Showing Why Education Is Important to Our Society | Habitat for  Humanity">
+            <a:extLst>
+              <a:ext uri="{FF2B5EF4-FFF2-40B4-BE49-F238E27FC236}">
+                <a16:creationId xmlns:a16="http://schemas.microsoft.com/office/drawing/2014/main" id="{1853B963-525B-98DF-2070-5BC46970FAF9}"/>
               </a:ext>
             </a:extLst>
           </p:cNvPr>
@@ -5221,7 +5362,7 @@
           </p:cNvPicPr>
           <p:nvPr/>
         </p:nvPicPr>
-        <p:blipFill>
+        <p:blipFill rotWithShape="1">
           <a:blip r:embed="rId2">
             <a:extLst>
               <a:ext uri="{28A0092B-C50C-407E-A947-70E740481C1C}">
@@ -5229,14 +5370,13 @@
               </a:ext>
             </a:extLst>
           </a:blip>
-          <a:stretch>
-            <a:fillRect/>
-          </a:stretch>
+          <a:srcRect l="35201" r="5465" b="-1"/>
+          <a:stretch/>
         </p:blipFill>
         <p:spPr bwMode="auto">
           <a:xfrm>
-            <a:off x="6698954" y="1862476"/>
-            <a:ext cx="2122424" cy="1414949"/>
+            <a:off x="6096000" y="10"/>
+            <a:ext cx="6095999" cy="6857990"/>
           </a:xfrm>
           <a:prstGeom prst="rect">
             <a:avLst/>
@@ -5253,102 +5393,10 @@
           </a:extLst>
         </p:spPr>
       </p:pic>
-      <p:pic>
-        <p:nvPicPr>
-          <p:cNvPr id="3074" name="Picture 2" descr="GitHub Logo and symbol, meaning, history, PNG, brand">
-            <a:extLst>
-              <a:ext uri="{FF2B5EF4-FFF2-40B4-BE49-F238E27FC236}">
-                <a16:creationId xmlns:a16="http://schemas.microsoft.com/office/drawing/2014/main" id="{AE357A19-1A11-DF79-364D-76D120898B73}"/>
-              </a:ext>
-            </a:extLst>
-          </p:cNvPr>
-          <p:cNvPicPr>
-            <a:picLocks noChangeAspect="1" noChangeArrowheads="1"/>
-          </p:cNvPicPr>
-          <p:nvPr/>
-        </p:nvPicPr>
-        <p:blipFill>
-          <a:blip r:embed="rId3">
-            <a:extLst>
-              <a:ext uri="{28A0092B-C50C-407E-A947-70E740481C1C}">
-                <a14:useLocalDpi xmlns:a14="http://schemas.microsoft.com/office/drawing/2010/main" val="0"/>
-              </a:ext>
-            </a:extLst>
-          </a:blip>
-          <a:stretch>
-            <a:fillRect/>
-          </a:stretch>
-        </p:blipFill>
-        <p:spPr bwMode="auto">
-          <a:xfrm>
-            <a:off x="9110754" y="2070714"/>
-            <a:ext cx="2128745" cy="1197419"/>
-          </a:xfrm>
-          <a:prstGeom prst="rect">
-            <a:avLst/>
-          </a:prstGeom>
-          <a:noFill/>
-          <a:extLst>
-            <a:ext uri="{909E8E84-426E-40DD-AFC4-6F175D3DCCD1}">
-              <a14:hiddenFill xmlns:a14="http://schemas.microsoft.com/office/drawing/2010/main">
-                <a:solidFill>
-                  <a:srgbClr val="FFFFFF"/>
-                </a:solidFill>
-              </a14:hiddenFill>
-            </a:ext>
-          </a:extLst>
-        </p:spPr>
-      </p:pic>
-      <p:pic>
-        <p:nvPicPr>
-          <p:cNvPr id="3078" name="Picture 6" descr="What is Scrum? | Scrum.org">
-            <a:extLst>
-              <a:ext uri="{FF2B5EF4-FFF2-40B4-BE49-F238E27FC236}">
-                <a16:creationId xmlns:a16="http://schemas.microsoft.com/office/drawing/2014/main" id="{483375BA-6157-15C4-A676-7993894A6820}"/>
-              </a:ext>
-            </a:extLst>
-          </p:cNvPr>
-          <p:cNvPicPr>
-            <a:picLocks noChangeAspect="1" noChangeArrowheads="1"/>
-          </p:cNvPicPr>
-          <p:nvPr/>
-        </p:nvPicPr>
-        <p:blipFill>
-          <a:blip r:embed="rId4">
-            <a:extLst>
-              <a:ext uri="{28A0092B-C50C-407E-A947-70E740481C1C}">
-                <a14:useLocalDpi xmlns:a14="http://schemas.microsoft.com/office/drawing/2010/main" val="0"/>
-              </a:ext>
-            </a:extLst>
-          </a:blip>
-          <a:stretch>
-            <a:fillRect/>
-          </a:stretch>
-        </p:blipFill>
-        <p:spPr bwMode="auto">
-          <a:xfrm>
-            <a:off x="6698954" y="3589867"/>
-            <a:ext cx="4540546" cy="2156759"/>
-          </a:xfrm>
-          <a:prstGeom prst="rect">
-            <a:avLst/>
-          </a:prstGeom>
-          <a:noFill/>
-          <a:extLst>
-            <a:ext uri="{909E8E84-426E-40DD-AFC4-6F175D3DCCD1}">
-              <a14:hiddenFill xmlns:a14="http://schemas.microsoft.com/office/drawing/2010/main">
-                <a:solidFill>
-                  <a:srgbClr val="FFFFFF"/>
-                </a:solidFill>
-              </a14:hiddenFill>
-            </a:ext>
-          </a:extLst>
-        </p:spPr>
-      </p:pic>
     </p:spTree>
     <p:extLst>
       <p:ext uri="{BB962C8B-B14F-4D97-AF65-F5344CB8AC3E}">
-        <p14:creationId xmlns:p14="http://schemas.microsoft.com/office/powerpoint/2010/main" val="165288482"/>
+        <p14:creationId xmlns:p14="http://schemas.microsoft.com/office/powerpoint/2010/main" val="992061264"/>
       </p:ext>
     </p:extLst>
   </p:cSld>
@@ -5385,7 +5433,7 @@
       </p:grpSpPr>
       <p:sp useBgFill="1">
         <p:nvSpPr>
-          <p:cNvPr id="1035" name="Rectangle 1030">
+          <p:cNvPr id="3102" name="Rectangle 3101">
             <a:extLst>
               <a:ext uri="{FF2B5EF4-FFF2-40B4-BE49-F238E27FC236}">
                 <a16:creationId xmlns:a16="http://schemas.microsoft.com/office/drawing/2014/main" id="{9184DF83-39E6-4BDC-9E23-17F25AB44C55}"/>
@@ -5477,98 +5525,23 @@
         </p:nvSpPr>
         <p:spPr>
           <a:xfrm>
-            <a:off x="952500" y="914400"/>
-            <a:ext cx="4326082" cy="990600"/>
-          </a:xfrm>
-        </p:spPr>
-        <p:txBody>
-          <a:bodyPr>
+            <a:off x="7034246" y="762001"/>
+            <a:ext cx="4242400" cy="1141004"/>
+          </a:xfrm>
+        </p:spPr>
+        <p:txBody>
+          <a:bodyPr vert="horz" lIns="91440" tIns="45720" rIns="91440" bIns="45720" rtlCol="0">
             <a:normAutofit/>
           </a:bodyPr>
           <a:lstStyle/>
           <a:p>
-            <a:pPr>
-              <a:lnSpc>
-                <a:spcPct val="110000"/>
-              </a:lnSpc>
-            </a:pPr>
-            <a:r>
-              <a:rPr lang="en-US" sz="1800"/>
-              <a:t>(already owned) Assets and a bit of research</a:t>
-            </a:r>
-          </a:p>
-        </p:txBody>
-      </p:sp>
-      <p:sp>
-        <p:nvSpPr>
-          <p:cNvPr id="3" name="Content Placeholder 2">
-            <a:extLst>
-              <a:ext uri="{FF2B5EF4-FFF2-40B4-BE49-F238E27FC236}">
-                <a16:creationId xmlns:a16="http://schemas.microsoft.com/office/drawing/2014/main" id="{6B034B1B-3FE2-8173-7E88-35B01A9E2E59}"/>
-              </a:ext>
-            </a:extLst>
-          </p:cNvPr>
-          <p:cNvSpPr>
-            <a:spLocks noGrp="1"/>
-          </p:cNvSpPr>
-          <p:nvPr>
-            <p:ph idx="1"/>
-          </p:nvPr>
-        </p:nvSpPr>
-        <p:spPr>
-          <a:xfrm>
-            <a:off x="952500" y="2285997"/>
-            <a:ext cx="4191000" cy="3890965"/>
-          </a:xfrm>
-        </p:spPr>
-        <p:txBody>
-          <a:bodyPr>
-            <a:normAutofit/>
-          </a:bodyPr>
-          <a:lstStyle/>
-          <a:p>
-            <a:r>
-              <a:rPr lang="en-US" dirty="0"/>
-              <a:t>Started researching about assets/packages that can help make the development faster/easier.</a:t>
-            </a:r>
-          </a:p>
-          <a:p>
-            <a:r>
-              <a:rPr lang="en-US" dirty="0"/>
-              <a:t>Prototyped multiple assets/packages, narrowed it down to a handful that can help me</a:t>
-            </a:r>
-          </a:p>
-        </p:txBody>
-      </p:sp>
-      <p:pic>
-        <p:nvPicPr>
-          <p:cNvPr id="5" name="Picture 4">
-            <a:extLst>
-              <a:ext uri="{FF2B5EF4-FFF2-40B4-BE49-F238E27FC236}">
-                <a16:creationId xmlns:a16="http://schemas.microsoft.com/office/drawing/2014/main" id="{22912D1C-9F23-213C-7F94-0BFDB8DE60FE}"/>
-              </a:ext>
-            </a:extLst>
-          </p:cNvPr>
-          <p:cNvPicPr>
-            <a:picLocks noChangeAspect="1"/>
-          </p:cNvPicPr>
-          <p:nvPr/>
-        </p:nvPicPr>
-        <p:blipFill rotWithShape="1">
-          <a:blip r:embed="rId2"/>
-          <a:srcRect t="2378" b="30232"/>
-          <a:stretch/>
-        </p:blipFill>
-        <p:spPr>
-          <a:xfrm>
-            <a:off x="6096000" y="10"/>
-            <a:ext cx="6096000" cy="3440526"/>
-          </a:xfrm>
-          <a:prstGeom prst="rect">
-            <a:avLst/>
-          </a:prstGeom>
-        </p:spPr>
-      </p:pic>
+            <a:r>
+              <a:rPr lang="en-US"/>
+              <a:t>Visuals</a:t>
+            </a:r>
+          </a:p>
+        </p:txBody>
+      </p:sp>
       <p:pic>
         <p:nvPicPr>
           <p:cNvPr id="1026" name="Picture 2" descr="screenshot">
@@ -5584,7 +5557,7 @@
           <p:nvPr/>
         </p:nvPicPr>
         <p:blipFill rotWithShape="1">
-          <a:blip r:embed="rId3">
+          <a:blip r:embed="rId2">
             <a:extLst>
               <a:ext uri="{28A0092B-C50C-407E-A947-70E740481C1C}">
                 <a14:useLocalDpi xmlns:a14="http://schemas.microsoft.com/office/drawing/2010/main" val="0"/>
@@ -5596,8 +5569,8 @@
         </p:blipFill>
         <p:spPr bwMode="auto">
           <a:xfrm>
-            <a:off x="6096000" y="3429000"/>
-            <a:ext cx="6096000" cy="3440536"/>
+            <a:off x="20" y="10"/>
+            <a:ext cx="6095980" cy="3440526"/>
           </a:xfrm>
           <a:prstGeom prst="rect">
             <a:avLst/>
@@ -5614,9 +5587,54 @@
           </a:extLst>
         </p:spPr>
       </p:pic>
-      <p:sp>
-        <p:nvSpPr>
-          <p:cNvPr id="1036" name="Rectangle 1032">
+      <p:pic>
+        <p:nvPicPr>
+          <p:cNvPr id="3074" name="Picture 2" descr="ArtStation - Low Poly House Interior and Exterior | Game Assets">
+            <a:extLst>
+              <a:ext uri="{FF2B5EF4-FFF2-40B4-BE49-F238E27FC236}">
+                <a16:creationId xmlns:a16="http://schemas.microsoft.com/office/drawing/2014/main" id="{DC60C8CD-9F18-FEEE-AF68-7E5D2A627CA0}"/>
+              </a:ext>
+            </a:extLst>
+          </p:cNvPr>
+          <p:cNvPicPr>
+            <a:picLocks noChangeAspect="1" noChangeArrowheads="1"/>
+          </p:cNvPicPr>
+          <p:nvPr/>
+        </p:nvPicPr>
+        <p:blipFill rotWithShape="1">
+          <a:blip r:embed="rId3">
+            <a:extLst>
+              <a:ext uri="{28A0092B-C50C-407E-A947-70E740481C1C}">
+                <a14:useLocalDpi xmlns:a14="http://schemas.microsoft.com/office/drawing/2010/main" val="0"/>
+              </a:ext>
+            </a:extLst>
+          </a:blip>
+          <a:srcRect r="334" b="-2"/>
+          <a:stretch/>
+        </p:blipFill>
+        <p:spPr bwMode="auto">
+          <a:xfrm>
+            <a:off x="20" y="3429000"/>
+            <a:ext cx="6095980" cy="3440536"/>
+          </a:xfrm>
+          <a:prstGeom prst="rect">
+            <a:avLst/>
+          </a:prstGeom>
+          <a:noFill/>
+          <a:extLst>
+            <a:ext uri="{909E8E84-426E-40DD-AFC4-6F175D3DCCD1}">
+              <a14:hiddenFill xmlns:a14="http://schemas.microsoft.com/office/drawing/2010/main">
+                <a:solidFill>
+                  <a:srgbClr val="FFFFFF"/>
+                </a:solidFill>
+              </a14:hiddenFill>
+            </a:ext>
+          </a:extLst>
+        </p:spPr>
+      </p:pic>
+      <p:sp>
+        <p:nvSpPr>
+          <p:cNvPr id="3104" name="Rectangle 3103">
             <a:extLst>
               <a:ext uri="{FF2B5EF4-FFF2-40B4-BE49-F238E27FC236}">
                 <a16:creationId xmlns:a16="http://schemas.microsoft.com/office/drawing/2014/main" id="{102E1699-0830-EE28-6BA6-C87CE22D3610}"/>
@@ -5639,15 +5657,15 @@
         </p:nvSpPr>
         <p:spPr>
           <a:xfrm>
-            <a:off x="6096000" y="3533220"/>
-            <a:ext cx="6096000" cy="3336316"/>
+            <a:off x="6096000" y="3229317"/>
+            <a:ext cx="6096000" cy="3640219"/>
           </a:xfrm>
           <a:prstGeom prst="rect">
             <a:avLst/>
           </a:prstGeom>
           <a:gradFill>
             <a:gsLst>
-              <a:gs pos="10000">
+              <a:gs pos="14000">
                 <a:schemeClr val="accent1">
                   <a:lumMod val="60000"/>
                   <a:lumOff val="40000"/>
@@ -5689,6 +5707,47 @@
           <a:p>
             <a:pPr algn="ctr"/>
             <a:endParaRPr lang="en-US" dirty="0"/>
+          </a:p>
+        </p:txBody>
+      </p:sp>
+      <p:sp>
+        <p:nvSpPr>
+          <p:cNvPr id="3" name="Content Placeholder 2">
+            <a:extLst>
+              <a:ext uri="{FF2B5EF4-FFF2-40B4-BE49-F238E27FC236}">
+                <a16:creationId xmlns:a16="http://schemas.microsoft.com/office/drawing/2014/main" id="{6B034B1B-3FE2-8173-7E88-35B01A9E2E59}"/>
+              </a:ext>
+            </a:extLst>
+          </p:cNvPr>
+          <p:cNvSpPr>
+            <a:spLocks noGrp="1"/>
+          </p:cNvSpPr>
+          <p:nvPr>
+            <p:ph idx="1"/>
+          </p:nvPr>
+        </p:nvSpPr>
+        <p:spPr>
+          <a:xfrm>
+            <a:off x="7038168" y="2286000"/>
+            <a:ext cx="4205849" cy="3810000"/>
+          </a:xfrm>
+        </p:spPr>
+        <p:txBody>
+          <a:bodyPr vert="horz" lIns="91440" tIns="45720" rIns="91440" bIns="45720" rtlCol="0">
+            <a:normAutofit/>
+          </a:bodyPr>
+          <a:lstStyle/>
+          <a:p>
+            <a:r>
+              <a:rPr lang="en-US" dirty="0"/>
+              <a:t>Art is not the focus of the project; therefore asset packs will be used.</a:t>
+            </a:r>
+          </a:p>
+          <a:p>
+            <a:r>
+              <a:rPr lang="en-US" dirty="0"/>
+              <a:t>The game will be based around a low-poly aesthetic, using pre-made assets from the Unity Asset Store</a:t>
+            </a:r>
           </a:p>
         </p:txBody>
       </p:sp>
@@ -5732,10 +5791,10 @@
       </p:grpSpPr>
       <p:sp useBgFill="1">
         <p:nvSpPr>
-          <p:cNvPr id="21" name="Rectangle 20">
-            <a:extLst>
-              <a:ext uri="{FF2B5EF4-FFF2-40B4-BE49-F238E27FC236}">
-                <a16:creationId xmlns:a16="http://schemas.microsoft.com/office/drawing/2014/main" id="{D70BC64E-B094-49DE-BD9C-DB662FCF598F}"/>
+          <p:cNvPr id="4113" name="Rectangle 4102">
+            <a:extLst>
+              <a:ext uri="{FF2B5EF4-FFF2-40B4-BE49-F238E27FC236}">
+                <a16:creationId xmlns:a16="http://schemas.microsoft.com/office/drawing/2014/main" id="{3DAD064D-86F0-42ED-B520-99689857918E}"/>
               </a:ext>
               <a:ext uri="{C183D7F6-B498-43B3-948B-1728B52AA6E4}">
                 <adec:decorative xmlns:adec="http://schemas.microsoft.com/office/drawing/2017/decorative" val="1"/>
@@ -5811,7 +5870,7 @@
           <p:cNvPr id="2" name="Title 1">
             <a:extLst>
               <a:ext uri="{FF2B5EF4-FFF2-40B4-BE49-F238E27FC236}">
-                <a16:creationId xmlns:a16="http://schemas.microsoft.com/office/drawing/2014/main" id="{BC738E08-91ED-FBA6-25F9-4DD025C05AE5}"/>
+                <a16:creationId xmlns:a16="http://schemas.microsoft.com/office/drawing/2014/main" id="{4FC72413-B4A4-322A-6D0D-FB93EB61810D}"/>
               </a:ext>
             </a:extLst>
           </p:cNvPr>
@@ -5824,8 +5883,8 @@
         </p:nvSpPr>
         <p:spPr>
           <a:xfrm>
-            <a:off x="6413912" y="687517"/>
-            <a:ext cx="4417522" cy="1181100"/>
+            <a:off x="952500" y="812042"/>
+            <a:ext cx="4264686" cy="1092958"/>
           </a:xfrm>
         </p:spPr>
         <p:txBody>
@@ -5835,18 +5894,19 @@
           <a:lstStyle/>
           <a:p>
             <a:r>
-              <a:rPr lang="en-US" dirty="0"/>
-              <a:t>Development</a:t>
-            </a:r>
-          </a:p>
-        </p:txBody>
-      </p:sp>
-      <p:sp>
-        <p:nvSpPr>
-          <p:cNvPr id="23" name="Rectangle 22">
-            <a:extLst>
-              <a:ext uri="{FF2B5EF4-FFF2-40B4-BE49-F238E27FC236}">
-                <a16:creationId xmlns:a16="http://schemas.microsoft.com/office/drawing/2014/main" id="{A718E0F5-1EF3-64D6-0802-B7983AC63269}"/>
+              <a:rPr lang="en-US"/>
+              <a:t>Scope</a:t>
+            </a:r>
+            <a:endParaRPr lang="en-US" dirty="0"/>
+          </a:p>
+        </p:txBody>
+      </p:sp>
+      <p:sp>
+        <p:nvSpPr>
+          <p:cNvPr id="4114" name="Rectangle 4104">
+            <a:extLst>
+              <a:ext uri="{FF2B5EF4-FFF2-40B4-BE49-F238E27FC236}">
+                <a16:creationId xmlns:a16="http://schemas.microsoft.com/office/drawing/2014/main" id="{17A4D85E-F98A-F670-16C3-7B2B0DA3A0DA}"/>
               </a:ext>
               <a:ext uri="{C183D7F6-B498-43B3-948B-1728B52AA6E4}">
                 <adec:decorative xmlns:adec="http://schemas.microsoft.com/office/drawing/2017/decorative" val="1"/>
@@ -5866,8 +5926,8 @@
         </p:nvSpPr>
         <p:spPr>
           <a:xfrm>
-            <a:off x="1" y="3737234"/>
-            <a:ext cx="12192000" cy="3120318"/>
+            <a:off x="0" y="3217781"/>
+            <a:ext cx="6096000" cy="3640219"/>
           </a:xfrm>
           <a:prstGeom prst="rect">
             <a:avLst/>
@@ -5915,16 +5975,16 @@
           <a:lstStyle/>
           <a:p>
             <a:pPr algn="ctr"/>
-            <a:endParaRPr lang="en-US"/>
-          </a:p>
-        </p:txBody>
-      </p:sp>
-      <p:sp>
-        <p:nvSpPr>
-          <p:cNvPr id="9" name="Content Placeholder 8">
-            <a:extLst>
-              <a:ext uri="{FF2B5EF4-FFF2-40B4-BE49-F238E27FC236}">
-                <a16:creationId xmlns:a16="http://schemas.microsoft.com/office/drawing/2014/main" id="{5E018B7D-5487-FF03-3FC4-0DFB7A57D655}"/>
+            <a:endParaRPr lang="en-US" dirty="0"/>
+          </a:p>
+        </p:txBody>
+      </p:sp>
+      <p:sp>
+        <p:nvSpPr>
+          <p:cNvPr id="3" name="Content Placeholder 2">
+            <a:extLst>
+              <a:ext uri="{FF2B5EF4-FFF2-40B4-BE49-F238E27FC236}">
+                <a16:creationId xmlns:a16="http://schemas.microsoft.com/office/drawing/2014/main" id="{F4F01A01-6A3D-BA36-C47D-FD71319C50F5}"/>
               </a:ext>
             </a:extLst>
           </p:cNvPr>
@@ -5937,7 +5997,7 @@
         </p:nvSpPr>
         <p:spPr>
           <a:xfrm>
-            <a:off x="6413912" y="2158012"/>
+            <a:off x="952500" y="2285997"/>
             <a:ext cx="4191000" cy="3890965"/>
           </a:xfrm>
         </p:spPr>
@@ -5949,50 +6009,69 @@
           <a:p>
             <a:r>
               <a:rPr lang="en-US" dirty="0"/>
-              <a:t>Started working on AI</a:t>
-            </a:r>
-          </a:p>
-          <a:p>
-            <a:r>
-              <a:rPr lang="en-US" dirty="0"/>
-              <a:t>Implemented assets/packages that will help with development</a:t>
-            </a:r>
+              <a:t>The prototype will showcase 5  caretaker specific technologies.</a:t>
+            </a:r>
+          </a:p>
+          <a:p>
+            <a:r>
+              <a:rPr lang="en-US" dirty="0"/>
+              <a:t>The target play time of the game is 70-100 minutes.</a:t>
+            </a:r>
+          </a:p>
+          <a:p>
+            <a:endParaRPr lang="en-US" dirty="0"/>
           </a:p>
         </p:txBody>
       </p:sp>
       <p:pic>
         <p:nvPicPr>
-          <p:cNvPr id="5" name="Content Placeholder 4">
-            <a:extLst>
-              <a:ext uri="{FF2B5EF4-FFF2-40B4-BE49-F238E27FC236}">
-                <a16:creationId xmlns:a16="http://schemas.microsoft.com/office/drawing/2014/main" id="{02969C9C-001D-434F-4CCE-7EE5A9CDF169}"/>
+          <p:cNvPr id="4098" name="Picture 2" descr="What is Project Scope Management?">
+            <a:extLst>
+              <a:ext uri="{FF2B5EF4-FFF2-40B4-BE49-F238E27FC236}">
+                <a16:creationId xmlns:a16="http://schemas.microsoft.com/office/drawing/2014/main" id="{1A754718-4871-9243-C233-220AA838FB22}"/>
               </a:ext>
             </a:extLst>
           </p:cNvPr>
           <p:cNvPicPr>
-            <a:picLocks noChangeAspect="1"/>
+            <a:picLocks noChangeAspect="1" noChangeArrowheads="1"/>
           </p:cNvPicPr>
           <p:nvPr/>
         </p:nvPicPr>
         <p:blipFill rotWithShape="1">
-          <a:blip r:embed="rId2"/>
-          <a:srcRect l="24718" r="20616"/>
+          <a:blip r:embed="rId2">
+            <a:extLst>
+              <a:ext uri="{28A0092B-C50C-407E-A947-70E740481C1C}">
+                <a14:useLocalDpi xmlns:a14="http://schemas.microsoft.com/office/drawing/2010/main" val="0"/>
+              </a:ext>
+            </a:extLst>
+          </a:blip>
+          <a:srcRect l="23691" r="31864"/>
           <a:stretch/>
         </p:blipFill>
-        <p:spPr>
-          <a:xfrm>
-            <a:off x="402998" y="1278067"/>
-            <a:ext cx="4082783" cy="4593188"/>
+        <p:spPr bwMode="auto">
+          <a:xfrm>
+            <a:off x="6096000" y="10"/>
+            <a:ext cx="6095999" cy="6857990"/>
           </a:xfrm>
           <a:prstGeom prst="rect">
             <a:avLst/>
           </a:prstGeom>
+          <a:noFill/>
+          <a:extLst>
+            <a:ext uri="{909E8E84-426E-40DD-AFC4-6F175D3DCCD1}">
+              <a14:hiddenFill xmlns:a14="http://schemas.microsoft.com/office/drawing/2010/main">
+                <a:solidFill>
+                  <a:srgbClr val="FFFFFF"/>
+                </a:solidFill>
+              </a14:hiddenFill>
+            </a:ext>
+          </a:extLst>
         </p:spPr>
       </p:pic>
     </p:spTree>
     <p:extLst>
       <p:ext uri="{BB962C8B-B14F-4D97-AF65-F5344CB8AC3E}">
-        <p14:creationId xmlns:p14="http://schemas.microsoft.com/office/powerpoint/2010/main" val="2739513423"/>
+        <p14:creationId xmlns:p14="http://schemas.microsoft.com/office/powerpoint/2010/main" val="3777800759"/>
       </p:ext>
     </p:extLst>
   </p:cSld>
@@ -6329,7 +6408,7 @@
         </p:nvSpPr>
         <p:spPr>
           <a:xfrm>
-            <a:off x="2238807" y="3826502"/>
+            <a:off x="2238806" y="3826502"/>
             <a:ext cx="7714388" cy="1048007"/>
           </a:xfrm>
         </p:spPr>
@@ -6341,8 +6420,12 @@
           <a:p>
             <a:pPr algn="ctr"/>
             <a:r>
-              <a:rPr lang="en-US"/>
-              <a:t>Demo</a:t>
+              <a:rPr lang="en-US" dirty="0" err="1"/>
+              <a:t>Ptototype</a:t>
+            </a:r>
+            <a:r>
+              <a:rPr lang="en-US" dirty="0"/>
+              <a:t> Demo</a:t>
             </a:r>
           </a:p>
         </p:txBody>

</xml_diff>